<commit_message>
oox smartart: handle <dgm:prSet ... custT="1"/>
Which defines that a data node has text properties as direct formatting,
so autoscale should not happen.

We decide autofit at a shape level, smartart defines custom text props
at a data node level. So take the shape, go to its first presentation
node, get its data node and see if it has custom text props. If not,
continue to scale text down till it fits.

smartart-autofit-sync.pptx is extended to contain a 3rd shape: the first
two have their autofit scaling synchronized, while the 3rd has a fixed
font size of 10pt.

Change-Id: I6caacdaab9a36072b9ad5021bd217c955b09b790
Reviewed-on: https://gerrit.libreoffice.org/c/core/+/102689
Reviewed-by: Miklos Vajna <vmiklos@collabora.com>
Tested-by: Jenkins
</commit_message>
<xml_diff>
--- a/sd/qa/unit/data/pptx/smartart-autofit-sync.pptx
+++ b/sd/qa/unit/data/pptx/smartart-autofit-sync.pptx
@@ -104,6 +104,11 @@
       </a:defRPr>
     </a:lvl9pPr>
   </p:defaultTextStyle>
+  <p:extLst>
+    <p:ext uri="{EFAFB233-063F-42B5-8137-9DF3F51BA10A}">
+      <p15:sldGuideLst xmlns:p15="http://schemas.microsoft.com/office/powerpoint/2012/main"/>
+    </p:ext>
+  </p:extLst>
 </p:presentation>
 </file>
 
@@ -857,11 +862,11 @@
 <file path=ppt/diagrams/data1.xml><?xml version="1.0" encoding="utf-8"?>
 <dgm:dataModel xmlns:dgm="http://schemas.openxmlformats.org/drawingml/2006/diagram" xmlns:a="http://schemas.openxmlformats.org/drawingml/2006/main">
   <dgm:ptLst>
-    <dgm:pt modelId="{5E912FBF-DA52-4299-B2D8-0C08A817BF2E}" type="doc">
+    <dgm:pt modelId="0" type="doc">
       <dgm:prSet loTypeId="urn:microsoft.com/office/officeart/2005/8/layout/pList2" loCatId="list" qsTypeId="urn:microsoft.com/office/officeart/2005/8/quickstyle/simple1" qsCatId="simple" csTypeId="urn:microsoft.com/office/officeart/2005/8/colors/accent1_2" csCatId="accent1" phldr="1"/>
       <dgm:spPr/>
     </dgm:pt>
-    <dgm:pt modelId="{3D8FC566-4933-408B-9076-6892CD1D1E04}">
+    <dgm:pt modelId="1">
       <dgm:prSet phldrT="[Text]"/>
       <dgm:spPr/>
       <dgm:t>
@@ -876,7 +881,7 @@
         </a:p>
       </dgm:t>
     </dgm:pt>
-    <dgm:pt modelId="{D7207557-C908-45AC-B665-0CD51FD16048}" type="parTrans" cxnId="{086C19DB-F9B6-4792-83B4-5F849A5D2D4B}">
+    <dgm:pt modelId="2" type="parTrans" cxnId="3">
       <dgm:prSet/>
       <dgm:spPr/>
       <dgm:t>
@@ -887,7 +892,7 @@
         </a:p>
       </dgm:t>
     </dgm:pt>
-    <dgm:pt modelId="{FBC4A332-8590-4B57-8C8A-C5F14D3EE296}" type="sibTrans" cxnId="{086C19DB-F9B6-4792-83B4-5F849A5D2D4B}">
+    <dgm:pt modelId="4" type="sibTrans" cxnId="3">
       <dgm:prSet/>
       <dgm:spPr/>
       <dgm:t>
@@ -898,7 +903,7 @@
         </a:p>
       </dgm:t>
     </dgm:pt>
-    <dgm:pt modelId="{34429171-66F7-44F6-AEAC-D89FB0304E8A}">
+    <dgm:pt modelId="5">
       <dgm:prSet phldrT="[Text]"/>
       <dgm:spPr/>
       <dgm:t>
@@ -913,7 +918,7 @@
         </a:p>
       </dgm:t>
     </dgm:pt>
-    <dgm:pt modelId="{9B496114-ECF0-4BC4-847E-D36443EC9082}" type="parTrans" cxnId="{F7347A90-3DE1-4201-ACDF-7814DA889AA1}">
+    <dgm:pt modelId="6" type="parTrans" cxnId="7">
       <dgm:prSet/>
       <dgm:spPr/>
       <dgm:t>
@@ -924,7 +929,7 @@
         </a:p>
       </dgm:t>
     </dgm:pt>
-    <dgm:pt modelId="{CE0F0B7D-ADD3-40D2-BC90-2236F596E708}" type="sibTrans" cxnId="{F7347A90-3DE1-4201-ACDF-7814DA889AA1}">
+    <dgm:pt modelId="8" type="sibTrans" cxnId="7">
       <dgm:prSet/>
       <dgm:spPr/>
       <dgm:t>
@@ -935,7 +940,44 @@
         </a:p>
       </dgm:t>
     </dgm:pt>
-    <dgm:pt modelId="{56386EB4-0607-4BBD-9096-6FABF4F8CCCF}">
+    <dgm:pt modelId="9">
+      <dgm:prSet phldrT="[Text]" custT="1"/>
+      <dgm:spPr/>
+      <dgm:t>
+        <a:bodyPr/>
+        <a:lstStyle/>
+        <a:p>
+          <a:r>
+            <a:rPr lang="hu-HU" sz="1600" dirty="0"/>
+            <a:t>C</a:t>
+          </a:r>
+          <a:endParaRPr lang="en-US" sz="1600" dirty="0"/>
+        </a:p>
+      </dgm:t>
+    </dgm:pt>
+    <dgm:pt modelId="10" type="parTrans" cxnId="11">
+      <dgm:prSet/>
+      <dgm:spPr/>
+      <dgm:t>
+        <a:bodyPr/>
+        <a:lstStyle/>
+        <a:p>
+          <a:endParaRPr lang="en-US"/>
+        </a:p>
+      </dgm:t>
+    </dgm:pt>
+    <dgm:pt modelId="12" type="sibTrans" cxnId="11">
+      <dgm:prSet/>
+      <dgm:spPr/>
+      <dgm:t>
+        <a:bodyPr/>
+        <a:lstStyle/>
+        <a:p>
+          <a:endParaRPr lang="en-US"/>
+        </a:p>
+      </dgm:t>
+    </dgm:pt>
+    <dgm:pt modelId="13">
       <dgm:prSet phldrT="[Text]"/>
       <dgm:spPr/>
       <dgm:t>
@@ -950,7 +992,7 @@
         </a:p>
       </dgm:t>
     </dgm:pt>
-    <dgm:pt modelId="{F3161881-D326-4A2D-8058-1CEDEDDD272B}" type="parTrans" cxnId="{270C4FEF-AE87-49ED-AFBE-99779720CB57}">
+    <dgm:pt modelId="14" type="parTrans" cxnId="15">
       <dgm:prSet/>
       <dgm:spPr/>
       <dgm:t>
@@ -961,7 +1003,7 @@
         </a:p>
       </dgm:t>
     </dgm:pt>
-    <dgm:pt modelId="{2F09BA05-842F-4BB6-850A-9C6ED31FEC0F}" type="sibTrans" cxnId="{270C4FEF-AE87-49ED-AFBE-99779720CB57}">
+    <dgm:pt modelId="16" type="sibTrans" cxnId="15">
       <dgm:prSet/>
       <dgm:spPr/>
       <dgm:t>
@@ -972,7 +1014,44 @@
         </a:p>
       </dgm:t>
     </dgm:pt>
-    <dgm:pt modelId="{89F9DD42-C414-4B47-A43C-C71D7361E927}">
+    <dgm:pt modelId="17">
+      <dgm:prSet phldrT="[Text]"/>
+      <dgm:spPr/>
+      <dgm:t>
+        <a:bodyPr/>
+        <a:lstStyle/>
+        <a:p>
+          <a:r>
+            <a:rPr lang="hu-HU" dirty="0"/>
+            <a:t>A2</a:t>
+          </a:r>
+          <a:endParaRPr lang="en-US" dirty="0"/>
+        </a:p>
+      </dgm:t>
+    </dgm:pt>
+    <dgm:pt modelId="18" type="parTrans" cxnId="19">
+      <dgm:prSet/>
+      <dgm:spPr/>
+      <dgm:t>
+        <a:bodyPr/>
+        <a:lstStyle/>
+        <a:p>
+          <a:endParaRPr lang="en-US"/>
+        </a:p>
+      </dgm:t>
+    </dgm:pt>
+    <dgm:pt modelId="20" type="sibTrans" cxnId="19">
+      <dgm:prSet/>
+      <dgm:spPr/>
+      <dgm:t>
+        <a:bodyPr/>
+        <a:lstStyle/>
+        <a:p>
+          <a:endParaRPr lang="en-US"/>
+        </a:p>
+      </dgm:t>
+    </dgm:pt>
+    <dgm:pt modelId="21">
       <dgm:prSet phldrT="[Text]"/>
       <dgm:spPr/>
       <dgm:t>
@@ -987,7 +1066,7 @@
         </a:p>
       </dgm:t>
     </dgm:pt>
-    <dgm:pt modelId="{EFD1432C-3CF5-48C5-8648-26410659979B}" type="parTrans" cxnId="{B46CB216-3C78-4E19-B1C9-829B75282799}">
+    <dgm:pt modelId="22" type="parTrans" cxnId="23">
       <dgm:prSet/>
       <dgm:spPr/>
       <dgm:t>
@@ -998,7 +1077,7 @@
         </a:p>
       </dgm:t>
     </dgm:pt>
-    <dgm:pt modelId="{DE363687-A692-450E-9EBF-9B96DBA6C8AD}" type="sibTrans" cxnId="{B46CB216-3C78-4E19-B1C9-829B75282799}">
+    <dgm:pt modelId="24" type="sibTrans" cxnId="23">
       <dgm:prSet/>
       <dgm:spPr/>
       <dgm:t>
@@ -1009,7 +1088,7 @@
         </a:p>
       </dgm:t>
     </dgm:pt>
-    <dgm:pt modelId="{943B743B-F3EB-49AA-9936-61A1817F64A5}">
+    <dgm:pt modelId="25">
       <dgm:prSet phldrT="[Text]"/>
       <dgm:spPr/>
       <dgm:t>
@@ -1024,7 +1103,7 @@
         </a:p>
       </dgm:t>
     </dgm:pt>
-    <dgm:pt modelId="{EDA7C034-DF28-4937-8E2C-0775FE8BE17C}" type="parTrans" cxnId="{A0726FF6-C591-4DB4-B700-A99FA5F7CDFC}">
+    <dgm:pt modelId="26" type="parTrans" cxnId="27">
       <dgm:prSet/>
       <dgm:spPr/>
       <dgm:t>
@@ -1035,7 +1114,7 @@
         </a:p>
       </dgm:t>
     </dgm:pt>
-    <dgm:pt modelId="{BF824F69-94A2-4452-9679-A21668A0C7DC}" type="sibTrans" cxnId="{A0726FF6-C591-4DB4-B700-A99FA5F7CDFC}">
+    <dgm:pt modelId="28" type="sibTrans" cxnId="27">
       <dgm:prSet/>
       <dgm:spPr/>
       <dgm:t>
@@ -1046,7 +1125,44 @@
         </a:p>
       </dgm:t>
     </dgm:pt>
-    <dgm:pt modelId="{F0790108-A950-4101-8B86-2598532DF0B6}">
+    <dgm:pt modelId="29">
+      <dgm:prSet phldrT="[Text]" custT="1"/>
+      <dgm:spPr/>
+      <dgm:t>
+        <a:bodyPr/>
+        <a:lstStyle/>
+        <a:p>
+          <a:r>
+            <a:rPr lang="hu-HU" sz="1400" dirty="0"/>
+            <a:t>C1</a:t>
+          </a:r>
+          <a:endParaRPr lang="en-US" sz="1400" dirty="0"/>
+        </a:p>
+      </dgm:t>
+    </dgm:pt>
+    <dgm:pt modelId="30" type="parTrans" cxnId="31">
+      <dgm:prSet/>
+      <dgm:spPr/>
+      <dgm:t>
+        <a:bodyPr/>
+        <a:lstStyle/>
+        <a:p>
+          <a:endParaRPr lang="en-US"/>
+        </a:p>
+      </dgm:t>
+    </dgm:pt>
+    <dgm:pt modelId="32" type="sibTrans" cxnId="31">
+      <dgm:prSet/>
+      <dgm:spPr/>
+      <dgm:t>
+        <a:bodyPr/>
+        <a:lstStyle/>
+        <a:p>
+          <a:endParaRPr lang="en-US"/>
+        </a:p>
+      </dgm:t>
+    </dgm:pt>
+    <dgm:pt modelId="33">
       <dgm:prSet phldrT="[Text]"/>
       <dgm:spPr/>
       <dgm:t>
@@ -1055,13 +1171,13 @@
         <a:p>
           <a:r>
             <a:rPr lang="hu-HU" dirty="0"/>
-            <a:t>A2</a:t>
+            <a:t>A3</a:t>
           </a:r>
           <a:endParaRPr lang="en-US" dirty="0"/>
         </a:p>
       </dgm:t>
     </dgm:pt>
-    <dgm:pt modelId="{834E0AE8-676D-450F-9D21-BB91F619C78B}" type="parTrans" cxnId="{8F1A744D-705D-46B8-A153-35C184BE3AA0}">
+    <dgm:pt modelId="34" type="parTrans" cxnId="35">
       <dgm:prSet/>
       <dgm:spPr/>
       <dgm:t>
@@ -1072,7 +1188,7 @@
         </a:p>
       </dgm:t>
     </dgm:pt>
-    <dgm:pt modelId="{A3925C4D-3280-494F-82CB-DF2BEA41DE63}" type="sibTrans" cxnId="{8F1A744D-705D-46B8-A153-35C184BE3AA0}">
+    <dgm:pt modelId="36" type="sibTrans" cxnId="35">
       <dgm:prSet/>
       <dgm:spPr/>
       <dgm:t>
@@ -1083,7 +1199,81 @@
         </a:p>
       </dgm:t>
     </dgm:pt>
-    <dgm:pt modelId="{032B055D-6C87-4CB3-8FBB-5D6ACCD766BE}">
+    <dgm:pt modelId="37">
+      <dgm:prSet phldrT="[Text]"/>
+      <dgm:spPr/>
+      <dgm:t>
+        <a:bodyPr/>
+        <a:lstStyle/>
+        <a:p>
+          <a:r>
+            <a:rPr lang="hu-HU" dirty="0"/>
+            <a:t>A4</a:t>
+          </a:r>
+          <a:endParaRPr lang="en-US" dirty="0"/>
+        </a:p>
+      </dgm:t>
+    </dgm:pt>
+    <dgm:pt modelId="38" type="parTrans" cxnId="39">
+      <dgm:prSet/>
+      <dgm:spPr/>
+      <dgm:t>
+        <a:bodyPr/>
+        <a:lstStyle/>
+        <a:p>
+          <a:endParaRPr lang="en-US"/>
+        </a:p>
+      </dgm:t>
+    </dgm:pt>
+    <dgm:pt modelId="40" type="sibTrans" cxnId="39">
+      <dgm:prSet/>
+      <dgm:spPr/>
+      <dgm:t>
+        <a:bodyPr/>
+        <a:lstStyle/>
+        <a:p>
+          <a:endParaRPr lang="en-US"/>
+        </a:p>
+      </dgm:t>
+    </dgm:pt>
+    <dgm:pt modelId="41">
+      <dgm:prSet phldrT="[Text]"/>
+      <dgm:spPr/>
+      <dgm:t>
+        <a:bodyPr/>
+        <a:lstStyle/>
+        <a:p>
+          <a:r>
+            <a:rPr lang="hu-HU" dirty="0"/>
+            <a:t>A5</a:t>
+          </a:r>
+          <a:endParaRPr lang="en-US" dirty="0"/>
+        </a:p>
+      </dgm:t>
+    </dgm:pt>
+    <dgm:pt modelId="42" type="parTrans" cxnId="43">
+      <dgm:prSet/>
+      <dgm:spPr/>
+      <dgm:t>
+        <a:bodyPr/>
+        <a:lstStyle/>
+        <a:p>
+          <a:endParaRPr lang="en-US"/>
+        </a:p>
+      </dgm:t>
+    </dgm:pt>
+    <dgm:pt modelId="44" type="sibTrans" cxnId="43">
+      <dgm:prSet/>
+      <dgm:spPr/>
+      <dgm:t>
+        <a:bodyPr/>
+        <a:lstStyle/>
+        <a:p>
+          <a:endParaRPr lang="en-US"/>
+        </a:p>
+      </dgm:t>
+    </dgm:pt>
+    <dgm:pt modelId="45">
       <dgm:prSet phldrT="[Text]"/>
       <dgm:spPr/>
       <dgm:t>
@@ -1098,7 +1288,7 @@
         </a:p>
       </dgm:t>
     </dgm:pt>
-    <dgm:pt modelId="{5FF9B047-EB7E-4041-A3A4-629464A0354B}" type="parTrans" cxnId="{F38D56F5-DB56-43CA-B629-DC0A6066C67E}">
+    <dgm:pt modelId="46" type="parTrans" cxnId="47">
       <dgm:prSet/>
       <dgm:spPr/>
       <dgm:t>
@@ -1109,7 +1299,7 @@
         </a:p>
       </dgm:t>
     </dgm:pt>
-    <dgm:pt modelId="{8B2F7C46-8B83-4B2C-97AB-C5BE4B17B536}" type="sibTrans" cxnId="{F38D56F5-DB56-43CA-B629-DC0A6066C67E}">
+    <dgm:pt modelId="48" type="sibTrans" cxnId="47">
       <dgm:prSet/>
       <dgm:spPr/>
       <dgm:t>
@@ -1120,7 +1310,7 @@
         </a:p>
       </dgm:t>
     </dgm:pt>
-    <dgm:pt modelId="{24022763-96A9-4CD4-80EE-7B6DCFFEAFAA}">
+    <dgm:pt modelId="49">
       <dgm:prSet phldrT="[Text]"/>
       <dgm:spPr/>
       <dgm:t>
@@ -1135,7 +1325,7 @@
         </a:p>
       </dgm:t>
     </dgm:pt>
-    <dgm:pt modelId="{991FC015-5075-4417-98DC-1965C2C40DFF}" type="parTrans" cxnId="{C644B8D0-D95A-4FAA-A799-65EBE557A08C}">
+    <dgm:pt modelId="50" type="parTrans" cxnId="51">
       <dgm:prSet/>
       <dgm:spPr/>
       <dgm:t>
@@ -1146,7 +1336,7 @@
         </a:p>
       </dgm:t>
     </dgm:pt>
-    <dgm:pt modelId="{3F98DDB1-B7F9-4207-A94F-53648FE9E141}" type="sibTrans" cxnId="{C644B8D0-D95A-4FAA-A799-65EBE557A08C}">
+    <dgm:pt modelId="52" type="sibTrans" cxnId="51">
       <dgm:prSet/>
       <dgm:spPr/>
       <dgm:t>
@@ -1157,81 +1347,7 @@
         </a:p>
       </dgm:t>
     </dgm:pt>
-    <dgm:pt modelId="{872790A6-F2BE-4AE6-80F6-F281ABB9A872}">
-      <dgm:prSet phldrT="[Text]"/>
-      <dgm:spPr/>
-      <dgm:t>
-        <a:bodyPr/>
-        <a:lstStyle/>
-        <a:p>
-          <a:r>
-            <a:rPr lang="hu-HU" dirty="0"/>
-            <a:t>A3</a:t>
-          </a:r>
-          <a:endParaRPr lang="en-US" dirty="0"/>
-        </a:p>
-      </dgm:t>
-    </dgm:pt>
-    <dgm:pt modelId="{786C4B43-3BA8-4A0D-B692-15C838636F6D}" type="parTrans" cxnId="{A5342C63-C17D-47E7-AE9F-C6F1CF4932E5}">
-      <dgm:prSet/>
-      <dgm:spPr/>
-      <dgm:t>
-        <a:bodyPr/>
-        <a:lstStyle/>
-        <a:p>
-          <a:endParaRPr lang="en-US"/>
-        </a:p>
-      </dgm:t>
-    </dgm:pt>
-    <dgm:pt modelId="{92CD3D6E-6F94-4207-9C50-1A6CA3DAEB6A}" type="sibTrans" cxnId="{A5342C63-C17D-47E7-AE9F-C6F1CF4932E5}">
-      <dgm:prSet/>
-      <dgm:spPr/>
-      <dgm:t>
-        <a:bodyPr/>
-        <a:lstStyle/>
-        <a:p>
-          <a:endParaRPr lang="en-US"/>
-        </a:p>
-      </dgm:t>
-    </dgm:pt>
-    <dgm:pt modelId="{1A3055E5-CE56-45F6-88BE-57CDFEB0E921}">
-      <dgm:prSet phldrT="[Text]"/>
-      <dgm:spPr/>
-      <dgm:t>
-        <a:bodyPr/>
-        <a:lstStyle/>
-        <a:p>
-          <a:r>
-            <a:rPr lang="hu-HU" dirty="0"/>
-            <a:t>A4</a:t>
-          </a:r>
-          <a:endParaRPr lang="en-US" dirty="0"/>
-        </a:p>
-      </dgm:t>
-    </dgm:pt>
-    <dgm:pt modelId="{267C2F48-79F7-4320-94DD-85309187075A}" type="parTrans" cxnId="{AA9CEB7B-B719-4CE2-A716-A3FE2FB64E5D}">
-      <dgm:prSet/>
-      <dgm:spPr/>
-      <dgm:t>
-        <a:bodyPr/>
-        <a:lstStyle/>
-        <a:p>
-          <a:endParaRPr lang="en-US"/>
-        </a:p>
-      </dgm:t>
-    </dgm:pt>
-    <dgm:pt modelId="{1AA106A5-53AF-4410-BAD6-26326F17B1BD}" type="sibTrans" cxnId="{AA9CEB7B-B719-4CE2-A716-A3FE2FB64E5D}">
-      <dgm:prSet/>
-      <dgm:spPr/>
-      <dgm:t>
-        <a:bodyPr/>
-        <a:lstStyle/>
-        <a:p>
-          <a:endParaRPr lang="en-US"/>
-        </a:p>
-      </dgm:t>
-    </dgm:pt>
-    <dgm:pt modelId="{A26F6E6A-C4DE-472B-8428-F575536D6462}">
+    <dgm:pt modelId="53">
       <dgm:prSet phldrT="[Text]"/>
       <dgm:spPr/>
       <dgm:t>
@@ -1246,7 +1362,7 @@
         </a:p>
       </dgm:t>
     </dgm:pt>
-    <dgm:pt modelId="{F7E4450E-FDAE-4275-9371-FF5F434C183A}" type="parTrans" cxnId="{022DC362-7611-4BE6-A1E5-3DF636783B1B}">
+    <dgm:pt modelId="54" type="parTrans" cxnId="55">
       <dgm:prSet/>
       <dgm:spPr/>
       <dgm:t>
@@ -1257,7 +1373,7 @@
         </a:p>
       </dgm:t>
     </dgm:pt>
-    <dgm:pt modelId="{C0B2189F-BB96-48FA-B7E9-4C71B19975DE}" type="sibTrans" cxnId="{022DC362-7611-4BE6-A1E5-3DF636783B1B}">
+    <dgm:pt modelId="56" type="sibTrans" cxnId="55">
       <dgm:prSet/>
       <dgm:spPr/>
       <dgm:t>
@@ -1268,7 +1384,7 @@
         </a:p>
       </dgm:t>
     </dgm:pt>
-    <dgm:pt modelId="{468E57D8-0441-4F18-BF74-240F04950938}">
+    <dgm:pt modelId="57">
       <dgm:prSet phldrT="[Text]"/>
       <dgm:spPr/>
       <dgm:t>
@@ -1283,7 +1399,7 @@
         </a:p>
       </dgm:t>
     </dgm:pt>
-    <dgm:pt modelId="{C9753001-1FFD-4E2F-83E8-5BA3F86F05D2}" type="parTrans" cxnId="{C0FA231E-992C-400E-BB0C-CDCA9E6F80A4}">
+    <dgm:pt modelId="58" type="parTrans" cxnId="59">
       <dgm:prSet/>
       <dgm:spPr/>
       <dgm:t>
@@ -1294,7 +1410,7 @@
         </a:p>
       </dgm:t>
     </dgm:pt>
-    <dgm:pt modelId="{B6DBDE8A-446D-4BC0-9134-082E7AB3F086}" type="sibTrans" cxnId="{C0FA231E-992C-400E-BB0C-CDCA9E6F80A4}">
+    <dgm:pt modelId="60" type="sibTrans" cxnId="59">
       <dgm:prSet/>
       <dgm:spPr/>
       <dgm:t>
@@ -1305,7 +1421,7 @@
         </a:p>
       </dgm:t>
     </dgm:pt>
-    <dgm:pt modelId="{5C0DB4EA-F8B3-4FB0-8035-85DA35DC6A1F}">
+    <dgm:pt modelId="61">
       <dgm:prSet phldrT="[Text]"/>
       <dgm:spPr/>
       <dgm:t>
@@ -1320,7 +1436,7 @@
         </a:p>
       </dgm:t>
     </dgm:pt>
-    <dgm:pt modelId="{EDABA6DF-782C-4F6D-BAC9-529B7EC7A864}" type="parTrans" cxnId="{11CFA19D-44A1-41D2-997C-1988A477B637}">
+    <dgm:pt modelId="62" type="parTrans" cxnId="63">
       <dgm:prSet/>
       <dgm:spPr/>
       <dgm:t>
@@ -1331,7 +1447,7 @@
         </a:p>
       </dgm:t>
     </dgm:pt>
-    <dgm:pt modelId="{4745D3B1-EB4C-43E5-8B83-19E12004EF32}" type="sibTrans" cxnId="{11CFA19D-44A1-41D2-997C-1988A477B637}">
+    <dgm:pt modelId="64" type="sibTrans" cxnId="63">
       <dgm:prSet/>
       <dgm:spPr/>
       <dgm:t>
@@ -1342,7 +1458,7 @@
         </a:p>
       </dgm:t>
     </dgm:pt>
-    <dgm:pt modelId="{286A1AD3-09F1-423F-B83F-F1FB716858A3}">
+    <dgm:pt modelId="65">
       <dgm:prSet phldrT="[Text]"/>
       <dgm:spPr/>
       <dgm:t>
@@ -1357,7 +1473,7 @@
         </a:p>
       </dgm:t>
     </dgm:pt>
-    <dgm:pt modelId="{89435421-B184-40E5-ADEA-16EA59D7C792}" type="parTrans" cxnId="{15470D03-BC1B-4500-A8E4-5AC83A0F2033}">
+    <dgm:pt modelId="66" type="parTrans" cxnId="67">
       <dgm:prSet/>
       <dgm:spPr/>
       <dgm:t>
@@ -1368,7 +1484,7 @@
         </a:p>
       </dgm:t>
     </dgm:pt>
-    <dgm:pt modelId="{53825DD4-93D5-4496-8468-E0C567BE5610}" type="sibTrans" cxnId="{15470D03-BC1B-4500-A8E4-5AC83A0F2033}">
+    <dgm:pt modelId="68" type="sibTrans" cxnId="67">
       <dgm:prSet/>
       <dgm:spPr/>
       <dgm:t>
@@ -1379,44 +1495,7 @@
         </a:p>
       </dgm:t>
     </dgm:pt>
-    <dgm:pt modelId="{0F907CFA-BDAA-44CE-8552-C8957C37DD84}">
-      <dgm:prSet phldrT="[Text]"/>
-      <dgm:spPr/>
-      <dgm:t>
-        <a:bodyPr/>
-        <a:lstStyle/>
-        <a:p>
-          <a:r>
-            <a:rPr lang="hu-HU" dirty="0"/>
-            <a:t>A5</a:t>
-          </a:r>
-          <a:endParaRPr lang="en-US" dirty="0"/>
-        </a:p>
-      </dgm:t>
-    </dgm:pt>
-    <dgm:pt modelId="{0201B0B2-E540-410C-9505-880E858369B3}" type="parTrans" cxnId="{D0A3A47D-0E2B-4E8C-8AC3-391F4608D930}">
-      <dgm:prSet/>
-      <dgm:spPr/>
-      <dgm:t>
-        <a:bodyPr/>
-        <a:lstStyle/>
-        <a:p>
-          <a:endParaRPr lang="en-US"/>
-        </a:p>
-      </dgm:t>
-    </dgm:pt>
-    <dgm:pt modelId="{9ED36ECF-B022-476C-809A-EF32CBF0C907}" type="sibTrans" cxnId="{D0A3A47D-0E2B-4E8C-8AC3-391F4608D930}">
-      <dgm:prSet/>
-      <dgm:spPr/>
-      <dgm:t>
-        <a:bodyPr/>
-        <a:lstStyle/>
-        <a:p>
-          <a:endParaRPr lang="en-US"/>
-        </a:p>
-      </dgm:t>
-    </dgm:pt>
-    <dgm:pt modelId="{E3D83C32-A8B8-4E14-B59B-1F8C3322B05D}">
+    <dgm:pt modelId="69">
       <dgm:prSet phldrT="[Text]"/>
       <dgm:spPr/>
       <dgm:t>
@@ -1431,7 +1510,7 @@
         </a:p>
       </dgm:t>
     </dgm:pt>
-    <dgm:pt modelId="{DBBD3BA9-E278-4750-84AC-DB9581882888}" type="parTrans" cxnId="{B82108BA-68EF-43A1-AC85-F5EECB33CE34}">
+    <dgm:pt modelId="70" type="parTrans" cxnId="71">
       <dgm:prSet/>
       <dgm:spPr/>
       <dgm:t>
@@ -1442,7 +1521,7 @@
         </a:p>
       </dgm:t>
     </dgm:pt>
-    <dgm:pt modelId="{24947782-C7FE-4196-8EE2-ACC6DAD1E6F2}" type="sibTrans" cxnId="{B82108BA-68EF-43A1-AC85-F5EECB33CE34}">
+    <dgm:pt modelId="72" type="sibTrans" cxnId="71">
       <dgm:prSet/>
       <dgm:spPr/>
       <dgm:t>
@@ -1453,7 +1532,7 @@
         </a:p>
       </dgm:t>
     </dgm:pt>
-    <dgm:pt modelId="{9A596A40-3D81-42E5-A7F5-E7B7D4725369}">
+    <dgm:pt modelId="73">
       <dgm:prSet phldrT="[Text]"/>
       <dgm:spPr/>
       <dgm:t>
@@ -1468,7 +1547,7 @@
         </a:p>
       </dgm:t>
     </dgm:pt>
-    <dgm:pt modelId="{802711EC-FBFC-437E-B87B-FB66604D67BF}" type="parTrans" cxnId="{58B8C098-7A2C-42E1-8BAA-D26EA8904CB0}">
+    <dgm:pt modelId="74" type="parTrans" cxnId="75">
       <dgm:prSet/>
       <dgm:spPr/>
       <dgm:t>
@@ -1479,7 +1558,7 @@
         </a:p>
       </dgm:t>
     </dgm:pt>
-    <dgm:pt modelId="{5576E9B6-F250-4A73-A0C7-3911A1CA000A}" type="sibTrans" cxnId="{58B8C098-7A2C-42E1-8BAA-D26EA8904CB0}">
+    <dgm:pt modelId="76" type="sibTrans" cxnId="75">
       <dgm:prSet/>
       <dgm:spPr/>
       <dgm:t>
@@ -1490,7 +1569,7 @@
         </a:p>
       </dgm:t>
     </dgm:pt>
-    <dgm:pt modelId="{0B0F4A96-0908-4268-9809-1D1F3384301F}">
+    <dgm:pt modelId="77">
       <dgm:prSet phldrT="[Text]"/>
       <dgm:spPr/>
       <dgm:t>
@@ -1505,7 +1584,7 @@
         </a:p>
       </dgm:t>
     </dgm:pt>
-    <dgm:pt modelId="{C41109F3-AB4C-498A-B98E-36E0E8BCE4DC}" type="parTrans" cxnId="{3C8DD6F5-2432-44B1-8510-FEE0D265C75D}">
+    <dgm:pt modelId="78" type="parTrans" cxnId="79">
       <dgm:prSet/>
       <dgm:spPr/>
       <dgm:t>
@@ -1516,7 +1595,7 @@
         </a:p>
       </dgm:t>
     </dgm:pt>
-    <dgm:pt modelId="{52E2F27E-8263-4727-9FEE-EE1961496FBD}" type="sibTrans" cxnId="{3C8DD6F5-2432-44B1-8510-FEE0D265C75D}">
+    <dgm:pt modelId="80" type="sibTrans" cxnId="79">
       <dgm:prSet/>
       <dgm:spPr/>
       <dgm:t>
@@ -1527,7 +1606,7 @@
         </a:p>
       </dgm:t>
     </dgm:pt>
-    <dgm:pt modelId="{6C1135C4-322F-4A6E-8901-938698E0762E}">
+    <dgm:pt modelId="81">
       <dgm:prSet phldrT="[Text]"/>
       <dgm:spPr/>
       <dgm:t>
@@ -1542,7 +1621,7 @@
         </a:p>
       </dgm:t>
     </dgm:pt>
-    <dgm:pt modelId="{857A8369-DCD4-4D60-8FE4-7C294108C06B}" type="parTrans" cxnId="{9C8EB74E-3E04-46A5-81E2-2F7A47F95E76}">
+    <dgm:pt modelId="82" type="parTrans" cxnId="83">
       <dgm:prSet/>
       <dgm:spPr/>
       <dgm:t>
@@ -1553,7 +1632,7 @@
         </a:p>
       </dgm:t>
     </dgm:pt>
-    <dgm:pt modelId="{92D6E9D7-248B-4F82-874B-C556E6B52E68}" type="sibTrans" cxnId="{9C8EB74E-3E04-46A5-81E2-2F7A47F95E76}">
+    <dgm:pt modelId="84" type="sibTrans" cxnId="83">
       <dgm:prSet/>
       <dgm:spPr/>
       <dgm:t>
@@ -1564,7 +1643,7 @@
         </a:p>
       </dgm:t>
     </dgm:pt>
-    <dgm:pt modelId="{8B546B76-426F-4F24-BF25-C070428E48BF}">
+    <dgm:pt modelId="85">
       <dgm:prSet phldrT="[Text]"/>
       <dgm:spPr/>
       <dgm:t>
@@ -1579,7 +1658,7 @@
         </a:p>
       </dgm:t>
     </dgm:pt>
-    <dgm:pt modelId="{89308FA9-AEB5-4B7E-9A0E-38149CE2ED3B}" type="parTrans" cxnId="{335E5FED-EC98-41BA-B244-EB55E1C1D17D}">
+    <dgm:pt modelId="86" type="parTrans" cxnId="87">
       <dgm:prSet/>
       <dgm:spPr/>
       <dgm:t>
@@ -1590,7 +1669,7 @@
         </a:p>
       </dgm:t>
     </dgm:pt>
-    <dgm:pt modelId="{25B149CA-1323-41DB-BFFC-19F196A9A221}" type="sibTrans" cxnId="{335E5FED-EC98-41BA-B244-EB55E1C1D17D}">
+    <dgm:pt modelId="88" type="sibTrans" cxnId="87">
       <dgm:prSet/>
       <dgm:spPr/>
       <dgm:t>
@@ -1601,7 +1680,7 @@
         </a:p>
       </dgm:t>
     </dgm:pt>
-    <dgm:pt modelId="{4E7FB301-B747-42C1-80D0-16265573728F}">
+    <dgm:pt modelId="89">
       <dgm:prSet phldrT="[Text]"/>
       <dgm:spPr/>
       <dgm:t>
@@ -1616,7 +1695,7 @@
         </a:p>
       </dgm:t>
     </dgm:pt>
-    <dgm:pt modelId="{1231BF79-F6D1-4703-BEB2-8E35D6E99C12}" type="parTrans" cxnId="{39F03663-A380-494F-8071-A277F1EFDE83}">
+    <dgm:pt modelId="90" type="parTrans" cxnId="91">
       <dgm:prSet/>
       <dgm:spPr/>
       <dgm:t>
@@ -1627,7 +1706,7 @@
         </a:p>
       </dgm:t>
     </dgm:pt>
-    <dgm:pt modelId="{E18559BF-BAB9-4D4D-B6B7-E6ADECF50229}" type="sibTrans" cxnId="{39F03663-A380-494F-8071-A277F1EFDE83}">
+    <dgm:pt modelId="92" type="sibTrans" cxnId="91">
       <dgm:prSet/>
       <dgm:spPr/>
       <dgm:t>
@@ -1638,7 +1717,7 @@
         </a:p>
       </dgm:t>
     </dgm:pt>
-    <dgm:pt modelId="{C14BC029-9B33-46CB-ADD5-F4EE96CCA6A2}">
+    <dgm:pt modelId="93">
       <dgm:prSet phldrT="[Text]"/>
       <dgm:spPr/>
       <dgm:t>
@@ -1653,7 +1732,7 @@
         </a:p>
       </dgm:t>
     </dgm:pt>
-    <dgm:pt modelId="{0A590F76-63BD-49CD-8F80-4E4C074E80D0}" type="parTrans" cxnId="{B3996A42-CBF3-4A6F-A14A-06961C505207}">
+    <dgm:pt modelId="94" type="parTrans" cxnId="95">
       <dgm:prSet/>
       <dgm:spPr/>
       <dgm:t>
@@ -1664,7 +1743,7 @@
         </a:p>
       </dgm:t>
     </dgm:pt>
-    <dgm:pt modelId="{1376AEA9-64DB-496C-BB23-4BACE040807B}" type="sibTrans" cxnId="{B3996A42-CBF3-4A6F-A14A-06961C505207}">
+    <dgm:pt modelId="96" type="sibTrans" cxnId="95">
       <dgm:prSet/>
       <dgm:spPr/>
       <dgm:t>
@@ -1675,7 +1754,7 @@
         </a:p>
       </dgm:t>
     </dgm:pt>
-    <dgm:pt modelId="{545E3FFA-49D3-43B4-9C1B-7BFBA599B4F8}">
+    <dgm:pt modelId="97">
       <dgm:prSet phldrT="[Text]"/>
       <dgm:spPr/>
       <dgm:t>
@@ -1690,7 +1769,7 @@
         </a:p>
       </dgm:t>
     </dgm:pt>
-    <dgm:pt modelId="{79EF19CD-8119-47B5-90E6-6C295000FF95}" type="parTrans" cxnId="{F7CF2001-97C7-4F0B-84C1-257C82FF3E42}">
+    <dgm:pt modelId="98" type="parTrans" cxnId="99">
       <dgm:prSet/>
       <dgm:spPr/>
       <dgm:t>
@@ -1701,7 +1780,7 @@
         </a:p>
       </dgm:t>
     </dgm:pt>
-    <dgm:pt modelId="{B00ABD8E-8A64-4E34-954B-47FAEBAE713A}" type="sibTrans" cxnId="{F7CF2001-97C7-4F0B-84C1-257C82FF3E42}">
+    <dgm:pt modelId="100" type="sibTrans" cxnId="99">
       <dgm:prSet/>
       <dgm:spPr/>
       <dgm:t>
@@ -1712,7 +1791,7 @@
         </a:p>
       </dgm:t>
     </dgm:pt>
-    <dgm:pt modelId="{962BFA4A-7DA0-4CEB-80B2-1C69B1BAC066}">
+    <dgm:pt modelId="101">
       <dgm:prSet phldrT="[Text]"/>
       <dgm:spPr/>
       <dgm:t>
@@ -1727,7 +1806,7 @@
         </a:p>
       </dgm:t>
     </dgm:pt>
-    <dgm:pt modelId="{4BC7C613-5CC2-45F8-A901-433B23133065}" type="parTrans" cxnId="{36D3EA27-BE08-4294-BE76-30DC20836DB4}">
+    <dgm:pt modelId="102" type="parTrans" cxnId="103">
       <dgm:prSet/>
       <dgm:spPr/>
       <dgm:t>
@@ -1738,7 +1817,7 @@
         </a:p>
       </dgm:t>
     </dgm:pt>
-    <dgm:pt modelId="{4A4BE6DA-BA3E-45E2-8292-81947B6E6E81}" type="sibTrans" cxnId="{36D3EA27-BE08-4294-BE76-30DC20836DB4}">
+    <dgm:pt modelId="104" type="sibTrans" cxnId="103">
       <dgm:prSet/>
       <dgm:spPr/>
       <dgm:t>
@@ -1749,7 +1828,7 @@
         </a:p>
       </dgm:t>
     </dgm:pt>
-    <dgm:pt modelId="{F4AC3454-D1FE-4D80-85EA-3C0F3523508C}">
+    <dgm:pt modelId="105">
       <dgm:prSet phldrT="[Text]"/>
       <dgm:spPr/>
       <dgm:t>
@@ -1764,7 +1843,7 @@
         </a:p>
       </dgm:t>
     </dgm:pt>
-    <dgm:pt modelId="{12654098-055D-4D71-8142-1092B6538D85}" type="parTrans" cxnId="{43E2FBB3-75FF-44CE-8885-7890E96A2E31}">
+    <dgm:pt modelId="106" type="parTrans" cxnId="107">
       <dgm:prSet/>
       <dgm:spPr/>
       <dgm:t>
@@ -1775,7 +1854,7 @@
         </a:p>
       </dgm:t>
     </dgm:pt>
-    <dgm:pt modelId="{EF606D21-D221-48A2-9457-0CFA583D4C4D}" type="sibTrans" cxnId="{43E2FBB3-75FF-44CE-8885-7890E96A2E31}">
+    <dgm:pt modelId="108" type="sibTrans" cxnId="107">
       <dgm:prSet/>
       <dgm:spPr/>
       <dgm:t>
@@ -1786,7 +1865,7 @@
         </a:p>
       </dgm:t>
     </dgm:pt>
-    <dgm:pt modelId="{F2594BC1-1725-40F0-8827-13BE7E35D352}">
+    <dgm:pt modelId="109">
       <dgm:prSet phldrT="[Text]"/>
       <dgm:spPr/>
       <dgm:t>
@@ -1801,7 +1880,7 @@
         </a:p>
       </dgm:t>
     </dgm:pt>
-    <dgm:pt modelId="{6208CA43-E88D-41D5-91EF-9B767DA68DEB}" type="parTrans" cxnId="{90DA0B92-DFCC-4795-9995-0FACAFFE8E39}">
+    <dgm:pt modelId="110" type="parTrans" cxnId="111">
       <dgm:prSet/>
       <dgm:spPr/>
       <dgm:t>
@@ -1812,7 +1891,7 @@
         </a:p>
       </dgm:t>
     </dgm:pt>
-    <dgm:pt modelId="{7AF1B401-3C9E-43D4-AF84-6BCE24113D58}" type="sibTrans" cxnId="{90DA0B92-DFCC-4795-9995-0FACAFFE8E39}">
+    <dgm:pt modelId="112" type="sibTrans" cxnId="111">
       <dgm:prSet/>
       <dgm:spPr/>
       <dgm:t>
@@ -1823,7 +1902,7 @@
         </a:p>
       </dgm:t>
     </dgm:pt>
-    <dgm:pt modelId="{C0F93879-12A6-479B-A19E-508DE62ED9FC}">
+    <dgm:pt modelId="113">
       <dgm:prSet phldrT="[Text]"/>
       <dgm:spPr/>
       <dgm:t>
@@ -1838,7 +1917,7 @@
         </a:p>
       </dgm:t>
     </dgm:pt>
-    <dgm:pt modelId="{F60FB50C-4F67-4DD6-93ED-F4E6B99BCD9B}" type="parTrans" cxnId="{E3EB36EF-EDEA-44F9-907E-6177D7529065}">
+    <dgm:pt modelId="114" type="parTrans" cxnId="115">
       <dgm:prSet/>
       <dgm:spPr/>
       <dgm:t>
@@ -1849,7 +1928,7 @@
         </a:p>
       </dgm:t>
     </dgm:pt>
-    <dgm:pt modelId="{009BE4D1-6DE8-429A-A984-DD2DDA3F7826}" type="sibTrans" cxnId="{E3EB36EF-EDEA-44F9-907E-6177D7529065}">
+    <dgm:pt modelId="116" type="sibTrans" cxnId="115">
       <dgm:prSet/>
       <dgm:spPr/>
       <dgm:t>
@@ -1860,8 +1939,8 @@
         </a:p>
       </dgm:t>
     </dgm:pt>
-    <dgm:pt modelId="{B6B21E7E-B218-461D-91D2-D96433C2FD24}" type="pres">
-      <dgm:prSet presAssocID="{5E912FBF-DA52-4299-B2D8-0C08A817BF2E}" presName="Name0" presStyleCnt="0">
+    <dgm:pt modelId="117" type="pres">
+      <dgm:prSet presAssocID="0" presName="Name0" presStyleCnt="0">
         <dgm:presLayoutVars>
           <dgm:dir/>
           <dgm:resizeHandles val="exact"/>
@@ -1869,127 +1948,161 @@
       </dgm:prSet>
       <dgm:spPr/>
     </dgm:pt>
-    <dgm:pt modelId="{C80D9A32-1645-4EFB-A78B-B1ABDAEC70A4}" type="pres">
-      <dgm:prSet presAssocID="{5E912FBF-DA52-4299-B2D8-0C08A817BF2E}" presName="bkgdShp" presStyleLbl="alignAccFollowNode1" presStyleIdx="0" presStyleCnt="1"/>
-      <dgm:spPr/>
-    </dgm:pt>
-    <dgm:pt modelId="{C2291E85-E084-451D-A577-F5FC62BB1A45}" type="pres">
-      <dgm:prSet presAssocID="{5E912FBF-DA52-4299-B2D8-0C08A817BF2E}" presName="linComp" presStyleCnt="0"/>
-      <dgm:spPr/>
-    </dgm:pt>
-    <dgm:pt modelId="{B292E9BF-FEDD-422D-A827-DCA99B40D205}" type="pres">
-      <dgm:prSet presAssocID="{3D8FC566-4933-408B-9076-6892CD1D1E04}" presName="compNode" presStyleCnt="0"/>
-      <dgm:spPr/>
-    </dgm:pt>
-    <dgm:pt modelId="{0CBF68AE-14D6-496D-A9B3-B61536E6C1A4}" type="pres">
-      <dgm:prSet presAssocID="{3D8FC566-4933-408B-9076-6892CD1D1E04}" presName="node" presStyleLbl="node1" presStyleIdx="0" presStyleCnt="2">
+    <dgm:pt modelId="118" type="pres">
+      <dgm:prSet presAssocID="0" presName="bkgdShp" presStyleLbl="alignAccFollowNode1" presStyleIdx="0" presStyleCnt="1"/>
+      <dgm:spPr/>
+    </dgm:pt>
+    <dgm:pt modelId="119" type="pres">
+      <dgm:prSet presAssocID="0" presName="linComp" presStyleCnt="0"/>
+      <dgm:spPr/>
+    </dgm:pt>
+    <dgm:pt modelId="120" type="pres">
+      <dgm:prSet presAssocID="1" presName="compNode" presStyleCnt="0"/>
+      <dgm:spPr/>
+    </dgm:pt>
+    <dgm:pt modelId="121" type="pres">
+      <dgm:prSet presAssocID="1" presName="node" presStyleLbl="node1" presStyleIdx="0" presStyleCnt="3">
         <dgm:presLayoutVars>
           <dgm:bulletEnabled val="1"/>
         </dgm:presLayoutVars>
       </dgm:prSet>
       <dgm:spPr/>
     </dgm:pt>
-    <dgm:pt modelId="{F921C784-0D41-40BD-A64B-D1D3F5184FB0}" type="pres">
-      <dgm:prSet presAssocID="{3D8FC566-4933-408B-9076-6892CD1D1E04}" presName="invisiNode" presStyleLbl="node1" presStyleIdx="0" presStyleCnt="2"/>
-      <dgm:spPr/>
-    </dgm:pt>
-    <dgm:pt modelId="{492A6745-3F97-4AFF-835A-85F1099FA625}" type="pres">
-      <dgm:prSet presAssocID="{3D8FC566-4933-408B-9076-6892CD1D1E04}" presName="imagNode" presStyleLbl="fgImgPlace1" presStyleIdx="0" presStyleCnt="2"/>
-      <dgm:spPr/>
-    </dgm:pt>
-    <dgm:pt modelId="{692BFBB6-E839-4706-84FA-D49CB9140965}" type="pres">
-      <dgm:prSet presAssocID="{FBC4A332-8590-4B57-8C8A-C5F14D3EE296}" presName="sibTrans" presStyleLbl="sibTrans2D1" presStyleIdx="0" presStyleCnt="0"/>
-      <dgm:spPr/>
-    </dgm:pt>
-    <dgm:pt modelId="{DD028C2E-1CCE-4CCB-BC4C-A921D3093B53}" type="pres">
-      <dgm:prSet presAssocID="{34429171-66F7-44F6-AEAC-D89FB0304E8A}" presName="compNode" presStyleCnt="0"/>
-      <dgm:spPr/>
-    </dgm:pt>
-    <dgm:pt modelId="{0AA02627-E4DA-4E1E-8413-987726E1B4E4}" type="pres">
-      <dgm:prSet presAssocID="{34429171-66F7-44F6-AEAC-D89FB0304E8A}" presName="node" presStyleLbl="node1" presStyleIdx="1" presStyleCnt="2">
+    <dgm:pt modelId="122" type="pres">
+      <dgm:prSet presAssocID="1" presName="invisiNode" presStyleLbl="node1" presStyleIdx="0" presStyleCnt="3"/>
+      <dgm:spPr/>
+    </dgm:pt>
+    <dgm:pt modelId="123" type="pres">
+      <dgm:prSet presAssocID="1" presName="imagNode" presStyleLbl="fgImgPlace1" presStyleIdx="0" presStyleCnt="3"/>
+      <dgm:spPr/>
+    </dgm:pt>
+    <dgm:pt modelId="124" type="pres">
+      <dgm:prSet presAssocID="4" presName="sibTrans" presStyleLbl="sibTrans2D1" presStyleIdx="0" presStyleCnt="0"/>
+      <dgm:spPr/>
+    </dgm:pt>
+    <dgm:pt modelId="125" type="pres">
+      <dgm:prSet presAssocID="5" presName="compNode" presStyleCnt="0"/>
+      <dgm:spPr/>
+    </dgm:pt>
+    <dgm:pt modelId="126" type="pres">
+      <dgm:prSet presAssocID="5" presName="node" presStyleLbl="node1" presStyleIdx="1" presStyleCnt="3">
         <dgm:presLayoutVars>
           <dgm:bulletEnabled val="1"/>
         </dgm:presLayoutVars>
       </dgm:prSet>
       <dgm:spPr/>
     </dgm:pt>
-    <dgm:pt modelId="{81709E5D-E17A-4152-BDB6-E28EB3AEFC3D}" type="pres">
-      <dgm:prSet presAssocID="{34429171-66F7-44F6-AEAC-D89FB0304E8A}" presName="invisiNode" presStyleLbl="node1" presStyleIdx="1" presStyleCnt="2"/>
-      <dgm:spPr/>
-    </dgm:pt>
-    <dgm:pt modelId="{562FB017-B502-4F5E-8D03-2BDF5B1780A4}" type="pres">
-      <dgm:prSet presAssocID="{34429171-66F7-44F6-AEAC-D89FB0304E8A}" presName="imagNode" presStyleLbl="fgImgPlace1" presStyleIdx="1" presStyleCnt="2"/>
+    <dgm:pt modelId="127" type="pres">
+      <dgm:prSet presAssocID="5" presName="invisiNode" presStyleLbl="node1" presStyleIdx="1" presStyleCnt="3"/>
+      <dgm:spPr/>
+    </dgm:pt>
+    <dgm:pt modelId="128" type="pres">
+      <dgm:prSet presAssocID="5" presName="imagNode" presStyleLbl="fgImgPlace1" presStyleIdx="1" presStyleCnt="3"/>
+      <dgm:spPr/>
+    </dgm:pt>
+    <dgm:pt modelId="129" type="pres">
+      <dgm:prSet presAssocID="8" presName="sibTrans" presStyleLbl="sibTrans2D1" presStyleIdx="0" presStyleCnt="0"/>
+      <dgm:spPr/>
+    </dgm:pt>
+    <dgm:pt modelId="130" type="pres">
+      <dgm:prSet presAssocID="9" presName="compNode" presStyleCnt="0"/>
+      <dgm:spPr/>
+    </dgm:pt>
+    <dgm:pt modelId="131" type="pres">
+      <dgm:prSet presAssocID="9" presName="node" presStyleLbl="node1" presStyleIdx="2" presStyleCnt="3">
+        <dgm:presLayoutVars>
+          <dgm:bulletEnabled val="1"/>
+        </dgm:presLayoutVars>
+      </dgm:prSet>
+      <dgm:spPr/>
+    </dgm:pt>
+    <dgm:pt modelId="132" type="pres">
+      <dgm:prSet presAssocID="9" presName="invisiNode" presStyleLbl="node1" presStyleIdx="2" presStyleCnt="3"/>
+      <dgm:spPr/>
+    </dgm:pt>
+    <dgm:pt modelId="133" type="pres">
+      <dgm:prSet presAssocID="9" presName="imagNode" presStyleLbl="fgImgPlace1" presStyleIdx="2" presStyleCnt="3"/>
       <dgm:spPr/>
     </dgm:pt>
   </dgm:ptLst>
   <dgm:cxnLst>
-    <dgm:cxn modelId="{F7CF2001-97C7-4F0B-84C1-257C82FF3E42}" srcId="{34429171-66F7-44F6-AEAC-D89FB0304E8A}" destId="{545E3FFA-49D3-43B4-9C1B-7BFBA599B4F8}" srcOrd="15" destOrd="0" parTransId="{79EF19CD-8119-47B5-90E6-6C295000FF95}" sibTransId="{B00ABD8E-8A64-4E34-954B-47FAEBAE713A}"/>
-    <dgm:cxn modelId="{15470D03-BC1B-4500-A8E4-5AC83A0F2033}" srcId="{34429171-66F7-44F6-AEAC-D89FB0304E8A}" destId="{286A1AD3-09F1-423F-B83F-F1FB716858A3}" srcOrd="7" destOrd="0" parTransId="{89435421-B184-40E5-ADEA-16EA59D7C792}" sibTransId="{53825DD4-93D5-4496-8468-E0C567BE5610}"/>
-    <dgm:cxn modelId="{B46CB216-3C78-4E19-B1C9-829B75282799}" srcId="{34429171-66F7-44F6-AEAC-D89FB0304E8A}" destId="{89F9DD42-C414-4B47-A43C-C71D7361E927}" srcOrd="0" destOrd="0" parTransId="{EFD1432C-3CF5-48C5-8648-26410659979B}" sibTransId="{DE363687-A692-450E-9EBF-9B96DBA6C8AD}"/>
-    <dgm:cxn modelId="{5042EF16-3430-4331-A597-175C7E6CCB4D}" type="presOf" srcId="{24022763-96A9-4CD4-80EE-7B6DCFFEAFAA}" destId="{0AA02627-E4DA-4E1E-8413-987726E1B4E4}" srcOrd="0" destOrd="4" presId="urn:microsoft.com/office/officeart/2005/8/layout/pList2"/>
-    <dgm:cxn modelId="{B35D6C17-948B-446A-BC0B-45E911FD6C68}" type="presOf" srcId="{5C0DB4EA-F8B3-4FB0-8035-85DA35DC6A1F}" destId="{0AA02627-E4DA-4E1E-8413-987726E1B4E4}" srcOrd="0" destOrd="7" presId="urn:microsoft.com/office/officeart/2005/8/layout/pList2"/>
-    <dgm:cxn modelId="{0463FF18-873C-4E54-AF25-ECC92CC37599}" type="presOf" srcId="{C14BC029-9B33-46CB-ADD5-F4EE96CCA6A2}" destId="{0AA02627-E4DA-4E1E-8413-987726E1B4E4}" srcOrd="0" destOrd="15" presId="urn:microsoft.com/office/officeart/2005/8/layout/pList2"/>
-    <dgm:cxn modelId="{4A43E21A-46A6-4CDB-A144-08340241CAD9}" type="presOf" srcId="{872790A6-F2BE-4AE6-80F6-F281ABB9A872}" destId="{0CBF68AE-14D6-496D-A9B3-B61536E6C1A4}" srcOrd="0" destOrd="3" presId="urn:microsoft.com/office/officeart/2005/8/layout/pList2"/>
-    <dgm:cxn modelId="{C0FA231E-992C-400E-BB0C-CDCA9E6F80A4}" srcId="{34429171-66F7-44F6-AEAC-D89FB0304E8A}" destId="{468E57D8-0441-4F18-BF74-240F04950938}" srcOrd="5" destOrd="0" parTransId="{C9753001-1FFD-4E2F-83E8-5BA3F86F05D2}" sibTransId="{B6DBDE8A-446D-4BC0-9134-082E7AB3F086}"/>
-    <dgm:cxn modelId="{F60A6227-5B88-44F2-B892-B5640C132B29}" type="presOf" srcId="{89F9DD42-C414-4B47-A43C-C71D7361E927}" destId="{0AA02627-E4DA-4E1E-8413-987726E1B4E4}" srcOrd="0" destOrd="1" presId="urn:microsoft.com/office/officeart/2005/8/layout/pList2"/>
-    <dgm:cxn modelId="{36D3EA27-BE08-4294-BE76-30DC20836DB4}" srcId="{34429171-66F7-44F6-AEAC-D89FB0304E8A}" destId="{962BFA4A-7DA0-4CEB-80B2-1C69B1BAC066}" srcOrd="16" destOrd="0" parTransId="{4BC7C613-5CC2-45F8-A901-433B23133065}" sibTransId="{4A4BE6DA-BA3E-45E2-8292-81947B6E6E81}"/>
-    <dgm:cxn modelId="{3ACC7330-9E15-4D7A-9701-02AAFF6F0308}" type="presOf" srcId="{962BFA4A-7DA0-4CEB-80B2-1C69B1BAC066}" destId="{0AA02627-E4DA-4E1E-8413-987726E1B4E4}" srcOrd="0" destOrd="17" presId="urn:microsoft.com/office/officeart/2005/8/layout/pList2"/>
-    <dgm:cxn modelId="{66B35431-B5B3-4DFE-B438-8E7C6259A475}" type="presOf" srcId="{032B055D-6C87-4CB3-8FBB-5D6ACCD766BE}" destId="{0AA02627-E4DA-4E1E-8413-987726E1B4E4}" srcOrd="0" destOrd="3" presId="urn:microsoft.com/office/officeart/2005/8/layout/pList2"/>
-    <dgm:cxn modelId="{B3996A42-CBF3-4A6F-A14A-06961C505207}" srcId="{34429171-66F7-44F6-AEAC-D89FB0304E8A}" destId="{C14BC029-9B33-46CB-ADD5-F4EE96CCA6A2}" srcOrd="14" destOrd="0" parTransId="{0A590F76-63BD-49CD-8F80-4E4C074E80D0}" sibTransId="{1376AEA9-64DB-496C-BB23-4BACE040807B}"/>
-    <dgm:cxn modelId="{022DC362-7611-4BE6-A1E5-3DF636783B1B}" srcId="{34429171-66F7-44F6-AEAC-D89FB0304E8A}" destId="{A26F6E6A-C4DE-472B-8428-F575536D6462}" srcOrd="4" destOrd="0" parTransId="{F7E4450E-FDAE-4275-9371-FF5F434C183A}" sibTransId="{C0B2189F-BB96-48FA-B7E9-4C71B19975DE}"/>
-    <dgm:cxn modelId="{A5342C63-C17D-47E7-AE9F-C6F1CF4932E5}" srcId="{3D8FC566-4933-408B-9076-6892CD1D1E04}" destId="{872790A6-F2BE-4AE6-80F6-F281ABB9A872}" srcOrd="2" destOrd="0" parTransId="{786C4B43-3BA8-4A0D-B692-15C838636F6D}" sibTransId="{92CD3D6E-6F94-4207-9C50-1A6CA3DAEB6A}"/>
-    <dgm:cxn modelId="{39F03663-A380-494F-8071-A277F1EFDE83}" srcId="{34429171-66F7-44F6-AEAC-D89FB0304E8A}" destId="{4E7FB301-B747-42C1-80D0-16265573728F}" srcOrd="13" destOrd="0" parTransId="{1231BF79-F6D1-4703-BEB2-8E35D6E99C12}" sibTransId="{E18559BF-BAB9-4D4D-B6B7-E6ADECF50229}"/>
-    <dgm:cxn modelId="{AAA8114B-2B03-4D04-B3ED-45E3495E4E45}" type="presOf" srcId="{6C1135C4-322F-4A6E-8901-938698E0762E}" destId="{0AA02627-E4DA-4E1E-8413-987726E1B4E4}" srcOrd="0" destOrd="12" presId="urn:microsoft.com/office/officeart/2005/8/layout/pList2"/>
-    <dgm:cxn modelId="{9CA9876B-0194-4358-B8F9-19AD9EBF8214}" type="presOf" srcId="{1A3055E5-CE56-45F6-88BE-57CDFEB0E921}" destId="{0CBF68AE-14D6-496D-A9B3-B61536E6C1A4}" srcOrd="0" destOrd="4" presId="urn:microsoft.com/office/officeart/2005/8/layout/pList2"/>
-    <dgm:cxn modelId="{8F1A744D-705D-46B8-A153-35C184BE3AA0}" srcId="{3D8FC566-4933-408B-9076-6892CD1D1E04}" destId="{F0790108-A950-4101-8B86-2598532DF0B6}" srcOrd="1" destOrd="0" parTransId="{834E0AE8-676D-450F-9D21-BB91F619C78B}" sibTransId="{A3925C4D-3280-494F-82CB-DF2BEA41DE63}"/>
-    <dgm:cxn modelId="{9C8EB74E-3E04-46A5-81E2-2F7A47F95E76}" srcId="{34429171-66F7-44F6-AEAC-D89FB0304E8A}" destId="{6C1135C4-322F-4A6E-8901-938698E0762E}" srcOrd="11" destOrd="0" parTransId="{857A8369-DCD4-4D60-8FE4-7C294108C06B}" sibTransId="{92D6E9D7-248B-4F82-874B-C556E6B52E68}"/>
-    <dgm:cxn modelId="{1CD88B73-F8E3-4306-B764-FE6EA78F3AD7}" type="presOf" srcId="{0B0F4A96-0908-4268-9809-1D1F3384301F}" destId="{0AA02627-E4DA-4E1E-8413-987726E1B4E4}" srcOrd="0" destOrd="11" presId="urn:microsoft.com/office/officeart/2005/8/layout/pList2"/>
-    <dgm:cxn modelId="{0E643F54-9F77-4901-88BE-E079F7BDC200}" type="presOf" srcId="{943B743B-F3EB-49AA-9936-61A1817F64A5}" destId="{0AA02627-E4DA-4E1E-8413-987726E1B4E4}" srcOrd="0" destOrd="2" presId="urn:microsoft.com/office/officeart/2005/8/layout/pList2"/>
-    <dgm:cxn modelId="{BAC9FA58-9B4F-4D0C-AF38-809169E33EFC}" type="presOf" srcId="{56386EB4-0607-4BBD-9096-6FABF4F8CCCF}" destId="{0CBF68AE-14D6-496D-A9B3-B61536E6C1A4}" srcOrd="0" destOrd="1" presId="urn:microsoft.com/office/officeart/2005/8/layout/pList2"/>
-    <dgm:cxn modelId="{7744765A-C60C-4DB2-AE06-6367A15FB40F}" type="presOf" srcId="{8B546B76-426F-4F24-BF25-C070428E48BF}" destId="{0AA02627-E4DA-4E1E-8413-987726E1B4E4}" srcOrd="0" destOrd="13" presId="urn:microsoft.com/office/officeart/2005/8/layout/pList2"/>
-    <dgm:cxn modelId="{AA9CEB7B-B719-4CE2-A716-A3FE2FB64E5D}" srcId="{3D8FC566-4933-408B-9076-6892CD1D1E04}" destId="{1A3055E5-CE56-45F6-88BE-57CDFEB0E921}" srcOrd="3" destOrd="0" parTransId="{267C2F48-79F7-4320-94DD-85309187075A}" sibTransId="{1AA106A5-53AF-4410-BAD6-26326F17B1BD}"/>
-    <dgm:cxn modelId="{D0A3A47D-0E2B-4E8C-8AC3-391F4608D930}" srcId="{3D8FC566-4933-408B-9076-6892CD1D1E04}" destId="{0F907CFA-BDAA-44CE-8552-C8957C37DD84}" srcOrd="4" destOrd="0" parTransId="{0201B0B2-E540-410C-9505-880E858369B3}" sibTransId="{9ED36ECF-B022-476C-809A-EF32CBF0C907}"/>
-    <dgm:cxn modelId="{D144828C-C958-4AB7-BD93-24B9D65702C0}" type="presOf" srcId="{F2594BC1-1725-40F0-8827-13BE7E35D352}" destId="{0AA02627-E4DA-4E1E-8413-987726E1B4E4}" srcOrd="0" destOrd="19" presId="urn:microsoft.com/office/officeart/2005/8/layout/pList2"/>
-    <dgm:cxn modelId="{A0CBC78C-43C7-462E-9A8E-286880A65FF0}" type="presOf" srcId="{E3D83C32-A8B8-4E14-B59B-1F8C3322B05D}" destId="{0AA02627-E4DA-4E1E-8413-987726E1B4E4}" srcOrd="0" destOrd="9" presId="urn:microsoft.com/office/officeart/2005/8/layout/pList2"/>
-    <dgm:cxn modelId="{F7347A90-3DE1-4201-ACDF-7814DA889AA1}" srcId="{5E912FBF-DA52-4299-B2D8-0C08A817BF2E}" destId="{34429171-66F7-44F6-AEAC-D89FB0304E8A}" srcOrd="1" destOrd="0" parTransId="{9B496114-ECF0-4BC4-847E-D36443EC9082}" sibTransId="{CE0F0B7D-ADD3-40D2-BC90-2236F596E708}"/>
-    <dgm:cxn modelId="{5C22EA91-EF01-47DC-B6E8-A7A0E7B0BD8C}" type="presOf" srcId="{3D8FC566-4933-408B-9076-6892CD1D1E04}" destId="{0CBF68AE-14D6-496D-A9B3-B61536E6C1A4}" srcOrd="0" destOrd="0" presId="urn:microsoft.com/office/officeart/2005/8/layout/pList2"/>
-    <dgm:cxn modelId="{90DA0B92-DFCC-4795-9995-0FACAFFE8E39}" srcId="{34429171-66F7-44F6-AEAC-D89FB0304E8A}" destId="{F2594BC1-1725-40F0-8827-13BE7E35D352}" srcOrd="18" destOrd="0" parTransId="{6208CA43-E88D-41D5-91EF-9B767DA68DEB}" sibTransId="{7AF1B401-3C9E-43D4-AF84-6BCE24113D58}"/>
-    <dgm:cxn modelId="{C7464A96-6DD5-49C6-AAE2-B56FF0F68D81}" type="presOf" srcId="{F0790108-A950-4101-8B86-2598532DF0B6}" destId="{0CBF68AE-14D6-496D-A9B3-B61536E6C1A4}" srcOrd="0" destOrd="2" presId="urn:microsoft.com/office/officeart/2005/8/layout/pList2"/>
-    <dgm:cxn modelId="{58B8C098-7A2C-42E1-8BAA-D26EA8904CB0}" srcId="{34429171-66F7-44F6-AEAC-D89FB0304E8A}" destId="{9A596A40-3D81-42E5-A7F5-E7B7D4725369}" srcOrd="9" destOrd="0" parTransId="{802711EC-FBFC-437E-B87B-FB66604D67BF}" sibTransId="{5576E9B6-F250-4A73-A0C7-3911A1CA000A}"/>
-    <dgm:cxn modelId="{D3DEBF9C-DDB6-49BA-89CF-24C571FB7648}" type="presOf" srcId="{A26F6E6A-C4DE-472B-8428-F575536D6462}" destId="{0AA02627-E4DA-4E1E-8413-987726E1B4E4}" srcOrd="0" destOrd="5" presId="urn:microsoft.com/office/officeart/2005/8/layout/pList2"/>
-    <dgm:cxn modelId="{11CFA19D-44A1-41D2-997C-1988A477B637}" srcId="{34429171-66F7-44F6-AEAC-D89FB0304E8A}" destId="{5C0DB4EA-F8B3-4FB0-8035-85DA35DC6A1F}" srcOrd="6" destOrd="0" parTransId="{EDABA6DF-782C-4F6D-BAC9-529B7EC7A864}" sibTransId="{4745D3B1-EB4C-43E5-8B83-19E12004EF32}"/>
-    <dgm:cxn modelId="{B1A98CA6-7C67-488F-B986-64828CD9583F}" type="presOf" srcId="{34429171-66F7-44F6-AEAC-D89FB0304E8A}" destId="{0AA02627-E4DA-4E1E-8413-987726E1B4E4}" srcOrd="0" destOrd="0" presId="urn:microsoft.com/office/officeart/2005/8/layout/pList2"/>
-    <dgm:cxn modelId="{452047B1-D530-4971-B286-F62B4F83D587}" type="presOf" srcId="{FBC4A332-8590-4B57-8C8A-C5F14D3EE296}" destId="{692BFBB6-E839-4706-84FA-D49CB9140965}" srcOrd="0" destOrd="0" presId="urn:microsoft.com/office/officeart/2005/8/layout/pList2"/>
-    <dgm:cxn modelId="{7BBCE8B2-10DB-43CF-A176-F18F651A1376}" type="presOf" srcId="{4E7FB301-B747-42C1-80D0-16265573728F}" destId="{0AA02627-E4DA-4E1E-8413-987726E1B4E4}" srcOrd="0" destOrd="14" presId="urn:microsoft.com/office/officeart/2005/8/layout/pList2"/>
-    <dgm:cxn modelId="{43E2FBB3-75FF-44CE-8885-7890E96A2E31}" srcId="{34429171-66F7-44F6-AEAC-D89FB0304E8A}" destId="{F4AC3454-D1FE-4D80-85EA-3C0F3523508C}" srcOrd="17" destOrd="0" parTransId="{12654098-055D-4D71-8142-1092B6538D85}" sibTransId="{EF606D21-D221-48A2-9457-0CFA583D4C4D}"/>
-    <dgm:cxn modelId="{B82108BA-68EF-43A1-AC85-F5EECB33CE34}" srcId="{34429171-66F7-44F6-AEAC-D89FB0304E8A}" destId="{E3D83C32-A8B8-4E14-B59B-1F8C3322B05D}" srcOrd="8" destOrd="0" parTransId="{DBBD3BA9-E278-4750-84AC-DB9581882888}" sibTransId="{24947782-C7FE-4196-8EE2-ACC6DAD1E6F2}"/>
-    <dgm:cxn modelId="{BF13ACC2-DDEF-4D82-ACA0-B7E191801771}" type="presOf" srcId="{5E912FBF-DA52-4299-B2D8-0C08A817BF2E}" destId="{B6B21E7E-B218-461D-91D2-D96433C2FD24}" srcOrd="0" destOrd="0" presId="urn:microsoft.com/office/officeart/2005/8/layout/pList2"/>
-    <dgm:cxn modelId="{373B89D0-0FF3-4797-8CD0-529DB8F58B33}" type="presOf" srcId="{C0F93879-12A6-479B-A19E-508DE62ED9FC}" destId="{0AA02627-E4DA-4E1E-8413-987726E1B4E4}" srcOrd="0" destOrd="20" presId="urn:microsoft.com/office/officeart/2005/8/layout/pList2"/>
-    <dgm:cxn modelId="{C644B8D0-D95A-4FAA-A799-65EBE557A08C}" srcId="{34429171-66F7-44F6-AEAC-D89FB0304E8A}" destId="{24022763-96A9-4CD4-80EE-7B6DCFFEAFAA}" srcOrd="3" destOrd="0" parTransId="{991FC015-5075-4417-98DC-1965C2C40DFF}" sibTransId="{3F98DDB1-B7F9-4207-A94F-53648FE9E141}"/>
-    <dgm:cxn modelId="{7772C0D3-A03C-49A0-AF16-D653502FC61D}" type="presOf" srcId="{9A596A40-3D81-42E5-A7F5-E7B7D4725369}" destId="{0AA02627-E4DA-4E1E-8413-987726E1B4E4}" srcOrd="0" destOrd="10" presId="urn:microsoft.com/office/officeart/2005/8/layout/pList2"/>
-    <dgm:cxn modelId="{086C19DB-F9B6-4792-83B4-5F849A5D2D4B}" srcId="{5E912FBF-DA52-4299-B2D8-0C08A817BF2E}" destId="{3D8FC566-4933-408B-9076-6892CD1D1E04}" srcOrd="0" destOrd="0" parTransId="{D7207557-C908-45AC-B665-0CD51FD16048}" sibTransId="{FBC4A332-8590-4B57-8C8A-C5F14D3EE296}"/>
-    <dgm:cxn modelId="{59BF89DC-3684-4860-9CB7-E54A69988FB1}" type="presOf" srcId="{F4AC3454-D1FE-4D80-85EA-3C0F3523508C}" destId="{0AA02627-E4DA-4E1E-8413-987726E1B4E4}" srcOrd="0" destOrd="18" presId="urn:microsoft.com/office/officeart/2005/8/layout/pList2"/>
-    <dgm:cxn modelId="{4AF5A8E7-7A89-4040-BE5C-CFD3BF02456A}" type="presOf" srcId="{545E3FFA-49D3-43B4-9C1B-7BFBA599B4F8}" destId="{0AA02627-E4DA-4E1E-8413-987726E1B4E4}" srcOrd="0" destOrd="16" presId="urn:microsoft.com/office/officeart/2005/8/layout/pList2"/>
-    <dgm:cxn modelId="{5A56BDE8-2091-494D-A916-D240F86E0BA7}" type="presOf" srcId="{468E57D8-0441-4F18-BF74-240F04950938}" destId="{0AA02627-E4DA-4E1E-8413-987726E1B4E4}" srcOrd="0" destOrd="6" presId="urn:microsoft.com/office/officeart/2005/8/layout/pList2"/>
-    <dgm:cxn modelId="{58E3F9E9-07EB-4788-BE8A-2BFDF7CC17AD}" type="presOf" srcId="{0F907CFA-BDAA-44CE-8552-C8957C37DD84}" destId="{0CBF68AE-14D6-496D-A9B3-B61536E6C1A4}" srcOrd="0" destOrd="5" presId="urn:microsoft.com/office/officeart/2005/8/layout/pList2"/>
-    <dgm:cxn modelId="{CB2F4BEA-3055-472D-BB54-72F25E069265}" type="presOf" srcId="{286A1AD3-09F1-423F-B83F-F1FB716858A3}" destId="{0AA02627-E4DA-4E1E-8413-987726E1B4E4}" srcOrd="0" destOrd="8" presId="urn:microsoft.com/office/officeart/2005/8/layout/pList2"/>
-    <dgm:cxn modelId="{335E5FED-EC98-41BA-B244-EB55E1C1D17D}" srcId="{34429171-66F7-44F6-AEAC-D89FB0304E8A}" destId="{8B546B76-426F-4F24-BF25-C070428E48BF}" srcOrd="12" destOrd="0" parTransId="{89308FA9-AEB5-4B7E-9A0E-38149CE2ED3B}" sibTransId="{25B149CA-1323-41DB-BFFC-19F196A9A221}"/>
-    <dgm:cxn modelId="{E3EB36EF-EDEA-44F9-907E-6177D7529065}" srcId="{34429171-66F7-44F6-AEAC-D89FB0304E8A}" destId="{C0F93879-12A6-479B-A19E-508DE62ED9FC}" srcOrd="19" destOrd="0" parTransId="{F60FB50C-4F67-4DD6-93ED-F4E6B99BCD9B}" sibTransId="{009BE4D1-6DE8-429A-A984-DD2DDA3F7826}"/>
-    <dgm:cxn modelId="{270C4FEF-AE87-49ED-AFBE-99779720CB57}" srcId="{3D8FC566-4933-408B-9076-6892CD1D1E04}" destId="{56386EB4-0607-4BBD-9096-6FABF4F8CCCF}" srcOrd="0" destOrd="0" parTransId="{F3161881-D326-4A2D-8058-1CEDEDDD272B}" sibTransId="{2F09BA05-842F-4BB6-850A-9C6ED31FEC0F}"/>
-    <dgm:cxn modelId="{F38D56F5-DB56-43CA-B629-DC0A6066C67E}" srcId="{34429171-66F7-44F6-AEAC-D89FB0304E8A}" destId="{032B055D-6C87-4CB3-8FBB-5D6ACCD766BE}" srcOrd="2" destOrd="0" parTransId="{5FF9B047-EB7E-4041-A3A4-629464A0354B}" sibTransId="{8B2F7C46-8B83-4B2C-97AB-C5BE4B17B536}"/>
-    <dgm:cxn modelId="{3C8DD6F5-2432-44B1-8510-FEE0D265C75D}" srcId="{34429171-66F7-44F6-AEAC-D89FB0304E8A}" destId="{0B0F4A96-0908-4268-9809-1D1F3384301F}" srcOrd="10" destOrd="0" parTransId="{C41109F3-AB4C-498A-B98E-36E0E8BCE4DC}" sibTransId="{52E2F27E-8263-4727-9FEE-EE1961496FBD}"/>
-    <dgm:cxn modelId="{A0726FF6-C591-4DB4-B700-A99FA5F7CDFC}" srcId="{34429171-66F7-44F6-AEAC-D89FB0304E8A}" destId="{943B743B-F3EB-49AA-9936-61A1817F64A5}" srcOrd="1" destOrd="0" parTransId="{EDA7C034-DF28-4937-8E2C-0775FE8BE17C}" sibTransId="{BF824F69-94A2-4452-9679-A21668A0C7DC}"/>
-    <dgm:cxn modelId="{04E626D8-F5D4-4E96-AF30-4296D8437FF6}" type="presParOf" srcId="{B6B21E7E-B218-461D-91D2-D96433C2FD24}" destId="{C80D9A32-1645-4EFB-A78B-B1ABDAEC70A4}" srcOrd="0" destOrd="0" presId="urn:microsoft.com/office/officeart/2005/8/layout/pList2"/>
-    <dgm:cxn modelId="{4131C93F-4C26-4F4B-A096-E5DF4306BCF5}" type="presParOf" srcId="{B6B21E7E-B218-461D-91D2-D96433C2FD24}" destId="{C2291E85-E084-451D-A577-F5FC62BB1A45}" srcOrd="1" destOrd="0" presId="urn:microsoft.com/office/officeart/2005/8/layout/pList2"/>
-    <dgm:cxn modelId="{0391F11B-5E17-4302-A17A-6C98B9C195B1}" type="presParOf" srcId="{C2291E85-E084-451D-A577-F5FC62BB1A45}" destId="{B292E9BF-FEDD-422D-A827-DCA99B40D205}" srcOrd="0" destOrd="0" presId="urn:microsoft.com/office/officeart/2005/8/layout/pList2"/>
-    <dgm:cxn modelId="{465B43A7-44D1-4165-9553-DF1ECD1D1397}" type="presParOf" srcId="{B292E9BF-FEDD-422D-A827-DCA99B40D205}" destId="{0CBF68AE-14D6-496D-A9B3-B61536E6C1A4}" srcOrd="0" destOrd="0" presId="urn:microsoft.com/office/officeart/2005/8/layout/pList2"/>
-    <dgm:cxn modelId="{68A67572-7039-4D05-80B7-C0F5AD45D071}" type="presParOf" srcId="{B292E9BF-FEDD-422D-A827-DCA99B40D205}" destId="{F921C784-0D41-40BD-A64B-D1D3F5184FB0}" srcOrd="1" destOrd="0" presId="urn:microsoft.com/office/officeart/2005/8/layout/pList2"/>
-    <dgm:cxn modelId="{2CF3F9A6-FA4C-4E2D-B2FF-7FADD889690D}" type="presParOf" srcId="{B292E9BF-FEDD-422D-A827-DCA99B40D205}" destId="{492A6745-3F97-4AFF-835A-85F1099FA625}" srcOrd="2" destOrd="0" presId="urn:microsoft.com/office/officeart/2005/8/layout/pList2"/>
-    <dgm:cxn modelId="{B9CD1931-55AA-436D-B091-596F13024E35}" type="presParOf" srcId="{C2291E85-E084-451D-A577-F5FC62BB1A45}" destId="{692BFBB6-E839-4706-84FA-D49CB9140965}" srcOrd="1" destOrd="0" presId="urn:microsoft.com/office/officeart/2005/8/layout/pList2"/>
-    <dgm:cxn modelId="{D0FF59E6-9875-49F9-ABC6-BDA6D9EA7D76}" type="presParOf" srcId="{C2291E85-E084-451D-A577-F5FC62BB1A45}" destId="{DD028C2E-1CCE-4CCB-BC4C-A921D3093B53}" srcOrd="2" destOrd="0" presId="urn:microsoft.com/office/officeart/2005/8/layout/pList2"/>
-    <dgm:cxn modelId="{20EDF768-9643-4FC2-8AD5-B177A5B2CCE0}" type="presParOf" srcId="{DD028C2E-1CCE-4CCB-BC4C-A921D3093B53}" destId="{0AA02627-E4DA-4E1E-8413-987726E1B4E4}" srcOrd="0" destOrd="0" presId="urn:microsoft.com/office/officeart/2005/8/layout/pList2"/>
-    <dgm:cxn modelId="{6178702A-A694-4EBE-90A9-246B68E477E2}" type="presParOf" srcId="{DD028C2E-1CCE-4CCB-BC4C-A921D3093B53}" destId="{81709E5D-E17A-4152-BDB6-E28EB3AEFC3D}" srcOrd="1" destOrd="0" presId="urn:microsoft.com/office/officeart/2005/8/layout/pList2"/>
-    <dgm:cxn modelId="{8CB89462-48B1-4D8F-A732-1A4F99DE790F}" type="presParOf" srcId="{DD028C2E-1CCE-4CCB-BC4C-A921D3093B53}" destId="{562FB017-B502-4F5E-8D03-2BDF5B1780A4}" srcOrd="2" destOrd="0" presId="urn:microsoft.com/office/officeart/2005/8/layout/pList2"/>
+    <dgm:cxn modelId="67" srcId="5" destId="65" srcOrd="7" destOrd="0" parTransId="66" sibTransId="68"/>
+    <dgm:cxn modelId="134" type="presOf" srcId="57" destId="126" srcOrd="0" destOrd="6" presId="urn:microsoft.com/office/officeart/2005/8/layout/pList2"/>
+    <dgm:cxn modelId="135" type="presOf" srcId="25" destId="126" srcOrd="0" destOrd="2" presId="urn:microsoft.com/office/officeart/2005/8/layout/pList2"/>
+    <dgm:cxn modelId="136" type="presOf" srcId="4" destId="124" srcOrd="0" destOrd="0" presId="urn:microsoft.com/office/officeart/2005/8/layout/pList2"/>
+    <dgm:cxn modelId="137" type="presOf" srcId="101" destId="126" srcOrd="0" destOrd="17" presId="urn:microsoft.com/office/officeart/2005/8/layout/pList2"/>
+    <dgm:cxn modelId="138" type="presOf" srcId="13" destId="121" srcOrd="0" destOrd="1" presId="urn:microsoft.com/office/officeart/2005/8/layout/pList2"/>
+    <dgm:cxn modelId="3" srcId="0" destId="1" srcOrd="0" destOrd="0" parTransId="2" sibTransId="4"/>
+    <dgm:cxn modelId="11" srcId="0" destId="9" srcOrd="2" destOrd="0" parTransId="10" sibTransId="12"/>
+    <dgm:cxn modelId="139" type="presOf" srcId="97" destId="126" srcOrd="0" destOrd="16" presId="urn:microsoft.com/office/officeart/2005/8/layout/pList2"/>
+    <dgm:cxn modelId="71" srcId="5" destId="69" srcOrd="8" destOrd="0" parTransId="70" sibTransId="72"/>
+    <dgm:cxn modelId="140" type="presOf" srcId="65" destId="126" srcOrd="0" destOrd="8" presId="urn:microsoft.com/office/officeart/2005/8/layout/pList2"/>
+    <dgm:cxn modelId="51" srcId="5" destId="49" srcOrd="3" destOrd="0" parTransId="50" sibTransId="52"/>
+    <dgm:cxn modelId="141" type="presOf" srcId="0" destId="117" srcOrd="0" destOrd="0" presId="urn:microsoft.com/office/officeart/2005/8/layout/pList2"/>
+    <dgm:cxn modelId="142" type="presOf" srcId="8" destId="129" srcOrd="0" destOrd="0" presId="urn:microsoft.com/office/officeart/2005/8/layout/pList2"/>
+    <dgm:cxn modelId="59" srcId="5" destId="57" srcOrd="5" destOrd="0" parTransId="58" sibTransId="60"/>
+    <dgm:cxn modelId="143" type="presOf" srcId="45" destId="126" srcOrd="0" destOrd="3" presId="urn:microsoft.com/office/officeart/2005/8/layout/pList2"/>
+    <dgm:cxn modelId="19" srcId="1" destId="17" srcOrd="1" destOrd="0" parTransId="18" sibTransId="20"/>
+    <dgm:cxn modelId="95" srcId="5" destId="93" srcOrd="14" destOrd="0" parTransId="94" sibTransId="96"/>
+    <dgm:cxn modelId="144" type="presOf" srcId="69" destId="126" srcOrd="0" destOrd="9" presId="urn:microsoft.com/office/officeart/2005/8/layout/pList2"/>
+    <dgm:cxn modelId="115" srcId="5" destId="113" srcOrd="19" destOrd="0" parTransId="114" sibTransId="116"/>
+    <dgm:cxn modelId="103" srcId="5" destId="101" srcOrd="16" destOrd="0" parTransId="102" sibTransId="104"/>
+    <dgm:cxn modelId="145" type="presOf" srcId="85" destId="126" srcOrd="0" destOrd="13" presId="urn:microsoft.com/office/officeart/2005/8/layout/pList2"/>
+    <dgm:cxn modelId="55" srcId="5" destId="53" srcOrd="4" destOrd="0" parTransId="54" sibTransId="56"/>
+    <dgm:cxn modelId="146" type="presOf" srcId="73" destId="126" srcOrd="0" destOrd="10" presId="urn:microsoft.com/office/officeart/2005/8/layout/pList2"/>
+    <dgm:cxn modelId="147" type="presOf" srcId="61" destId="126" srcOrd="0" destOrd="7" presId="urn:microsoft.com/office/officeart/2005/8/layout/pList2"/>
+    <dgm:cxn modelId="75" srcId="5" destId="73" srcOrd="9" destOrd="0" parTransId="74" sibTransId="76"/>
+    <dgm:cxn modelId="148" type="presOf" srcId="37" destId="121" srcOrd="0" destOrd="4" presId="urn:microsoft.com/office/officeart/2005/8/layout/pList2"/>
+    <dgm:cxn modelId="83" srcId="5" destId="81" srcOrd="11" destOrd="0" parTransId="82" sibTransId="84"/>
+    <dgm:cxn modelId="149" type="presOf" srcId="113" destId="126" srcOrd="0" destOrd="20" presId="urn:microsoft.com/office/officeart/2005/8/layout/pList2"/>
+    <dgm:cxn modelId="27" srcId="5" destId="25" srcOrd="1" destOrd="0" parTransId="26" sibTransId="28"/>
+    <dgm:cxn modelId="150" type="presOf" srcId="49" destId="126" srcOrd="0" destOrd="4" presId="urn:microsoft.com/office/officeart/2005/8/layout/pList2"/>
+    <dgm:cxn modelId="47" srcId="5" destId="45" srcOrd="2" destOrd="0" parTransId="46" sibTransId="48"/>
+    <dgm:cxn modelId="43" srcId="1" destId="41" srcOrd="4" destOrd="0" parTransId="42" sibTransId="44"/>
+    <dgm:cxn modelId="151" type="presOf" srcId="81" destId="126" srcOrd="0" destOrd="12" presId="urn:microsoft.com/office/officeart/2005/8/layout/pList2"/>
+    <dgm:cxn modelId="152" type="presOf" srcId="105" destId="126" srcOrd="0" destOrd="18" presId="urn:microsoft.com/office/officeart/2005/8/layout/pList2"/>
+    <dgm:cxn modelId="153" type="presOf" srcId="21" destId="126" srcOrd="0" destOrd="1" presId="urn:microsoft.com/office/officeart/2005/8/layout/pList2"/>
+    <dgm:cxn modelId="154" type="presOf" srcId="41" destId="121" srcOrd="0" destOrd="5" presId="urn:microsoft.com/office/officeart/2005/8/layout/pList2"/>
+    <dgm:cxn modelId="23" srcId="5" destId="21" srcOrd="0" destOrd="0" parTransId="22" sibTransId="24"/>
+    <dgm:cxn modelId="87" srcId="5" destId="85" srcOrd="12" destOrd="0" parTransId="86" sibTransId="88"/>
+    <dgm:cxn modelId="155" type="presOf" srcId="9" destId="131" srcOrd="0" destOrd="0" presId="urn:microsoft.com/office/officeart/2005/8/layout/pList2"/>
+    <dgm:cxn modelId="156" type="presOf" srcId="93" destId="126" srcOrd="0" destOrd="15" presId="urn:microsoft.com/office/officeart/2005/8/layout/pList2"/>
+    <dgm:cxn modelId="157" type="presOf" srcId="77" destId="126" srcOrd="0" destOrd="11" presId="urn:microsoft.com/office/officeart/2005/8/layout/pList2"/>
+    <dgm:cxn modelId="158" type="presOf" srcId="17" destId="121" srcOrd="0" destOrd="2" presId="urn:microsoft.com/office/officeart/2005/8/layout/pList2"/>
+    <dgm:cxn modelId="15" srcId="1" destId="13" srcOrd="0" destOrd="0" parTransId="14" sibTransId="16"/>
+    <dgm:cxn modelId="159" type="presOf" srcId="1" destId="121" srcOrd="0" destOrd="0" presId="urn:microsoft.com/office/officeart/2005/8/layout/pList2"/>
+    <dgm:cxn modelId="160" type="presOf" srcId="29" destId="131" srcOrd="0" destOrd="1" presId="urn:microsoft.com/office/officeart/2005/8/layout/pList2"/>
+    <dgm:cxn modelId="63" srcId="5" destId="61" srcOrd="6" destOrd="0" parTransId="62" sibTransId="64"/>
+    <dgm:cxn modelId="161" type="presOf" srcId="89" destId="126" srcOrd="0" destOrd="14" presId="urn:microsoft.com/office/officeart/2005/8/layout/pList2"/>
+    <dgm:cxn modelId="39" srcId="1" destId="37" srcOrd="3" destOrd="0" parTransId="38" sibTransId="40"/>
+    <dgm:cxn modelId="99" srcId="5" destId="97" srcOrd="15" destOrd="0" parTransId="98" sibTransId="100"/>
+    <dgm:cxn modelId="111" srcId="5" destId="109" srcOrd="18" destOrd="0" parTransId="110" sibTransId="112"/>
+    <dgm:cxn modelId="162" type="presOf" srcId="5" destId="126" srcOrd="0" destOrd="0" presId="urn:microsoft.com/office/officeart/2005/8/layout/pList2"/>
+    <dgm:cxn modelId="7" srcId="0" destId="5" srcOrd="1" destOrd="0" parTransId="6" sibTransId="8"/>
+    <dgm:cxn modelId="91" srcId="5" destId="89" srcOrd="13" destOrd="0" parTransId="90" sibTransId="92"/>
+    <dgm:cxn modelId="163" type="presOf" srcId="53" destId="126" srcOrd="0" destOrd="5" presId="urn:microsoft.com/office/officeart/2005/8/layout/pList2"/>
+    <dgm:cxn modelId="31" srcId="9" destId="29" srcOrd="0" destOrd="0" parTransId="30" sibTransId="32"/>
+    <dgm:cxn modelId="35" srcId="1" destId="33" srcOrd="2" destOrd="0" parTransId="34" sibTransId="36"/>
+    <dgm:cxn modelId="107" srcId="5" destId="105" srcOrd="17" destOrd="0" parTransId="106" sibTransId="108"/>
+    <dgm:cxn modelId="164" type="presOf" srcId="33" destId="121" srcOrd="0" destOrd="3" presId="urn:microsoft.com/office/officeart/2005/8/layout/pList2"/>
+    <dgm:cxn modelId="165" type="presOf" srcId="109" destId="126" srcOrd="0" destOrd="19" presId="urn:microsoft.com/office/officeart/2005/8/layout/pList2"/>
+    <dgm:cxn modelId="79" srcId="5" destId="77" srcOrd="10" destOrd="0" parTransId="78" sibTransId="80"/>
+    <dgm:cxn modelId="166" type="presParOf" srcId="117" destId="118" srcOrd="0" destOrd="0" presId="urn:microsoft.com/office/officeart/2005/8/layout/pList2"/>
+    <dgm:cxn modelId="167" type="presParOf" srcId="117" destId="119" srcOrd="1" destOrd="0" presId="urn:microsoft.com/office/officeart/2005/8/layout/pList2"/>
+    <dgm:cxn modelId="168" type="presParOf" srcId="119" destId="120" srcOrd="0" destOrd="0" presId="urn:microsoft.com/office/officeart/2005/8/layout/pList2"/>
+    <dgm:cxn modelId="169" type="presParOf" srcId="120" destId="121" srcOrd="0" destOrd="0" presId="urn:microsoft.com/office/officeart/2005/8/layout/pList2"/>
+    <dgm:cxn modelId="170" type="presParOf" srcId="120" destId="122" srcOrd="1" destOrd="0" presId="urn:microsoft.com/office/officeart/2005/8/layout/pList2"/>
+    <dgm:cxn modelId="171" type="presParOf" srcId="120" destId="123" srcOrd="2" destOrd="0" presId="urn:microsoft.com/office/officeart/2005/8/layout/pList2"/>
+    <dgm:cxn modelId="172" type="presParOf" srcId="119" destId="124" srcOrd="1" destOrd="0" presId="urn:microsoft.com/office/officeart/2005/8/layout/pList2"/>
+    <dgm:cxn modelId="173" type="presParOf" srcId="119" destId="125" srcOrd="2" destOrd="0" presId="urn:microsoft.com/office/officeart/2005/8/layout/pList2"/>
+    <dgm:cxn modelId="174" type="presParOf" srcId="125" destId="126" srcOrd="0" destOrd="0" presId="urn:microsoft.com/office/officeart/2005/8/layout/pList2"/>
+    <dgm:cxn modelId="175" type="presParOf" srcId="125" destId="127" srcOrd="1" destOrd="0" presId="urn:microsoft.com/office/officeart/2005/8/layout/pList2"/>
+    <dgm:cxn modelId="176" type="presParOf" srcId="125" destId="128" srcOrd="2" destOrd="0" presId="urn:microsoft.com/office/officeart/2005/8/layout/pList2"/>
+    <dgm:cxn modelId="177" type="presParOf" srcId="119" destId="129" srcOrd="3" destOrd="0" presId="urn:microsoft.com/office/officeart/2005/8/layout/pList2"/>
+    <dgm:cxn modelId="178" type="presParOf" srcId="119" destId="130" srcOrd="4" destOrd="0" presId="urn:microsoft.com/office/officeart/2005/8/layout/pList2"/>
+    <dgm:cxn modelId="179" type="presParOf" srcId="130" destId="131" srcOrd="0" destOrd="0" presId="urn:microsoft.com/office/officeart/2005/8/layout/pList2"/>
+    <dgm:cxn modelId="180" type="presParOf" srcId="130" destId="132" srcOrd="1" destOrd="0" presId="urn:microsoft.com/office/officeart/2005/8/layout/pList2"/>
+    <dgm:cxn modelId="181" type="presParOf" srcId="130" destId="133" srcOrd="2" destOrd="0" presId="urn:microsoft.com/office/officeart/2005/8/layout/pList2"/>
   </dgm:cxnLst>
   <dgm:bg/>
   <dgm:whole/>
@@ -2082,108 +2195,122 @@
       <dgm:constr type="ctrX" for="ch" forName="linComp" refType="w" fact="0.5"/>
     </dgm:constrLst>
     <dgm:ruleLst/>
-    <dgm:layoutNode name="bkgdShp" styleLbl="alignAccFollowNode1">
-      <dgm:alg type="sp"/>
-      <dgm:shape xmlns:r="http://schemas.openxmlformats.org/officeDocument/2006/relationships" type="roundRect" r:blip="">
-        <dgm:adjLst>
-          <dgm:adj idx="1" val="0.1"/>
-        </dgm:adjLst>
-      </dgm:shape>
-      <dgm:presOf/>
-      <dgm:constrLst/>
-      <dgm:ruleLst/>
-    </dgm:layoutNode>
-    <dgm:layoutNode name="linComp">
-      <dgm:alg type="lin"/>
-      <dgm:shape xmlns:r="http://schemas.openxmlformats.org/officeDocument/2006/relationships" r:blip="">
-        <dgm:adjLst/>
-      </dgm:shape>
-      <dgm:presOf/>
-      <dgm:constrLst>
-        <dgm:constr type="w" for="ch" forName="compNode" refType="w"/>
-        <dgm:constr type="h" for="ch" forName="compNode" refType="h"/>
-        <dgm:constr type="w" for="ch" ptType="sibTrans" refType="w" refFor="ch" refForName="compNode" fact="0.1"/>
-        <dgm:constr type="h" for="ch" ptType="sibTrans" op="equ"/>
-        <dgm:constr type="h" for="ch" forName="compNode" op="equ"/>
-        <dgm:constr type="primFontSz" for="des" forName="node" op="equ"/>
-      </dgm:constrLst>
-      <dgm:ruleLst/>
-      <dgm:forEach name="nodesForEach" axis="ch" ptType="node">
-        <dgm:layoutNode name="compNode">
-          <dgm:alg type="composite"/>
+    <dgm:choose name="Name1">
+      <dgm:if name="Name2" axis="ch" ptType="node" func="cnt" op="gte" val="1">
+        <dgm:layoutNode name="bkgdShp" styleLbl="alignAccFollowNode1">
+          <dgm:alg type="sp"/>
+          <dgm:shape xmlns:r="http://schemas.openxmlformats.org/officeDocument/2006/relationships" type="roundRect" r:blip="">
+            <dgm:adjLst>
+              <dgm:adj idx="1" val="0.1"/>
+            </dgm:adjLst>
+          </dgm:shape>
+          <dgm:presOf/>
+          <dgm:constrLst/>
+          <dgm:ruleLst/>
+        </dgm:layoutNode>
+        <dgm:layoutNode name="linComp">
+          <dgm:choose name="Name3">
+            <dgm:if name="Name4" func="var" arg="dir" op="equ" val="norm">
+              <dgm:alg type="lin"/>
+            </dgm:if>
+            <dgm:else name="Name5">
+              <dgm:alg type="lin">
+                <dgm:param type="linDir" val="fromR"/>
+              </dgm:alg>
+            </dgm:else>
+          </dgm:choose>
           <dgm:shape xmlns:r="http://schemas.openxmlformats.org/officeDocument/2006/relationships" r:blip="">
             <dgm:adjLst/>
           </dgm:shape>
           <dgm:presOf/>
           <dgm:constrLst>
-            <dgm:constr type="w" for="ch" forName="node" refType="w"/>
-            <dgm:constr type="h" for="ch" forName="node" refType="h" fact="0.55"/>
-            <dgm:constr type="b" for="ch" forName="node" refType="h"/>
-            <dgm:constr type="w" for="ch" forName="invisiNode" refType="w" fact="0.75"/>
-            <dgm:constr type="h" for="ch" forName="invisiNode" refType="h" fact="0.06"/>
-            <dgm:constr type="t" for="ch" forName="invisiNode"/>
-            <dgm:constr type="w" for="ch" forName="imagNode" refType="w"/>
-            <dgm:constr type="h" for="ch" forName="imagNode" refType="h" fact="0.33"/>
-            <dgm:constr type="ctrX" for="ch" forName="imagNode" refType="w" fact="0.5"/>
-            <dgm:constr type="t" for="ch" forName="imagNode" refType="h" fact="0.06"/>
+            <dgm:constr type="w" for="ch" forName="compNode" refType="w"/>
+            <dgm:constr type="h" for="ch" forName="compNode" refType="h"/>
+            <dgm:constr type="w" for="ch" ptType="sibTrans" refType="w" refFor="ch" refForName="compNode" fact="0.1"/>
+            <dgm:constr type="h" for="ch" ptType="sibTrans" op="equ"/>
+            <dgm:constr type="h" for="ch" forName="compNode" op="equ"/>
+            <dgm:constr type="primFontSz" for="des" forName="node" op="equ"/>
           </dgm:constrLst>
           <dgm:ruleLst/>
-          <dgm:layoutNode name="node" styleLbl="node1">
-            <dgm:varLst>
-              <dgm:bulletEnabled val="1"/>
-            </dgm:varLst>
-            <dgm:alg type="tx">
-              <dgm:param type="txAnchorVert" val="t"/>
-            </dgm:alg>
-            <dgm:shape xmlns:r="http://schemas.openxmlformats.org/officeDocument/2006/relationships" rot="180" type="round2SameRect" r:blip="">
-              <dgm:adjLst>
-                <dgm:adj idx="1" val="0.105"/>
-              </dgm:adjLst>
-            </dgm:shape>
-            <dgm:presOf axis="desOrSelf" ptType="node"/>
-            <dgm:constrLst>
-              <dgm:constr type="primFontSz" val="65"/>
-            </dgm:constrLst>
-            <dgm:ruleLst>
-              <dgm:rule type="primFontSz" val="5" fact="NaN" max="NaN"/>
-            </dgm:ruleLst>
-          </dgm:layoutNode>
-          <dgm:layoutNode name="invisiNode">
-            <dgm:alg type="sp"/>
-            <dgm:shape xmlns:r="http://schemas.openxmlformats.org/officeDocument/2006/relationships" type="roundRect" r:blip="" hideGeom="1">
-              <dgm:adjLst>
-                <dgm:adj idx="1" val="0.1"/>
-              </dgm:adjLst>
-            </dgm:shape>
-            <dgm:presOf/>
-            <dgm:constrLst/>
-            <dgm:ruleLst/>
-          </dgm:layoutNode>
-          <dgm:layoutNode name="imagNode" styleLbl="fgImgPlace1">
-            <dgm:alg type="sp"/>
-            <dgm:shape xmlns:r="http://schemas.openxmlformats.org/officeDocument/2006/relationships" type="roundRect" r:blip="" zOrderOff="-2" blipPhldr="1">
-              <dgm:adjLst>
-                <dgm:adj idx="1" val="0.1"/>
-              </dgm:adjLst>
-            </dgm:shape>
-            <dgm:presOf/>
-            <dgm:constrLst/>
-            <dgm:ruleLst/>
-          </dgm:layoutNode>
+          <dgm:forEach name="nodesForEach" axis="ch" ptType="node">
+            <dgm:layoutNode name="compNode">
+              <dgm:alg type="composite"/>
+              <dgm:shape xmlns:r="http://schemas.openxmlformats.org/officeDocument/2006/relationships" r:blip="">
+                <dgm:adjLst/>
+              </dgm:shape>
+              <dgm:presOf/>
+              <dgm:constrLst>
+                <dgm:constr type="w" for="ch" forName="node" refType="w"/>
+                <dgm:constr type="h" for="ch" forName="node" refType="h" fact="0.55"/>
+                <dgm:constr type="b" for="ch" forName="node" refType="h"/>
+                <dgm:constr type="w" for="ch" forName="invisiNode" refType="w" fact="0.75"/>
+                <dgm:constr type="h" for="ch" forName="invisiNode" refType="h" fact="0.06"/>
+                <dgm:constr type="t" for="ch" forName="invisiNode"/>
+                <dgm:constr type="w" for="ch" forName="imagNode" refType="w"/>
+                <dgm:constr type="h" for="ch" forName="imagNode" refType="h" fact="0.33"/>
+                <dgm:constr type="ctrX" for="ch" forName="imagNode" refType="w" fact="0.5"/>
+                <dgm:constr type="t" for="ch" forName="imagNode" refType="h" fact="0.06"/>
+              </dgm:constrLst>
+              <dgm:ruleLst/>
+              <dgm:layoutNode name="node" styleLbl="node1">
+                <dgm:varLst>
+                  <dgm:bulletEnabled val="1"/>
+                </dgm:varLst>
+                <dgm:alg type="tx">
+                  <dgm:param type="txAnchorVert" val="t"/>
+                </dgm:alg>
+                <dgm:shape xmlns:r="http://schemas.openxmlformats.org/officeDocument/2006/relationships" rot="180" type="round2SameRect" r:blip="">
+                  <dgm:adjLst>
+                    <dgm:adj idx="1" val="0.105"/>
+                  </dgm:adjLst>
+                </dgm:shape>
+                <dgm:presOf axis="desOrSelf" ptType="node"/>
+                <dgm:constrLst>
+                  <dgm:constr type="primFontSz" val="65"/>
+                </dgm:constrLst>
+                <dgm:ruleLst>
+                  <dgm:rule type="primFontSz" val="5" fact="NaN" max="NaN"/>
+                </dgm:ruleLst>
+              </dgm:layoutNode>
+              <dgm:layoutNode name="invisiNode">
+                <dgm:alg type="sp"/>
+                <dgm:shape xmlns:r="http://schemas.openxmlformats.org/officeDocument/2006/relationships" type="roundRect" r:blip="" hideGeom="1">
+                  <dgm:adjLst>
+                    <dgm:adj idx="1" val="0.1"/>
+                  </dgm:adjLst>
+                </dgm:shape>
+                <dgm:presOf/>
+                <dgm:constrLst/>
+                <dgm:ruleLst/>
+              </dgm:layoutNode>
+              <dgm:layoutNode name="imagNode" styleLbl="fgImgPlace1">
+                <dgm:alg type="sp"/>
+                <dgm:shape xmlns:r="http://schemas.openxmlformats.org/officeDocument/2006/relationships" type="roundRect" r:blip="" zOrderOff="-2" blipPhldr="1">
+                  <dgm:adjLst>
+                    <dgm:adj idx="1" val="0.1"/>
+                  </dgm:adjLst>
+                </dgm:shape>
+                <dgm:presOf/>
+                <dgm:constrLst/>
+                <dgm:ruleLst/>
+              </dgm:layoutNode>
+            </dgm:layoutNode>
+            <dgm:forEach name="sibTransForEach" axis="followSib" ptType="sibTrans" cnt="1">
+              <dgm:layoutNode name="sibTrans">
+                <dgm:alg type="sp"/>
+                <dgm:shape xmlns:r="http://schemas.openxmlformats.org/officeDocument/2006/relationships" type="rect" r:blip="" hideGeom="1">
+                  <dgm:adjLst/>
+                </dgm:shape>
+                <dgm:presOf axis="self"/>
+                <dgm:constrLst/>
+                <dgm:ruleLst/>
+              </dgm:layoutNode>
+            </dgm:forEach>
+          </dgm:forEach>
         </dgm:layoutNode>
-        <dgm:forEach name="sibTransForEach" axis="followSib" ptType="sibTrans" cnt="1">
-          <dgm:layoutNode name="sibTrans">
-            <dgm:alg type="sp"/>
-            <dgm:shape xmlns:r="http://schemas.openxmlformats.org/officeDocument/2006/relationships" type="rect" r:blip="" hideGeom="1">
-              <dgm:adjLst/>
-            </dgm:shape>
-            <dgm:presOf axis="self"/>
-            <dgm:constrLst/>
-            <dgm:ruleLst/>
-          </dgm:layoutNode>
-        </dgm:forEach>
-      </dgm:forEach>
-    </dgm:layoutNode>
+      </dgm:if>
+      <dgm:else name="Name6"/>
+    </dgm:choose>
   </dgm:layoutNode>
 </dgm:layoutDef>
 </file>
@@ -3369,7 +3496,7 @@
           <a:p>
             <a:fld id="{D1352E03-2E80-4246-BE52-69E32A323EDD}" type="datetimeFigureOut">
               <a:rPr lang="en-US" smtClean="0"/>
-              <a:t>2020-09-08</a:t>
+              <a:t>2020-09-13</a:t>
             </a:fld>
             <a:endParaRPr lang="en-US"/>
           </a:p>
@@ -3567,7 +3694,7 @@
           <a:p>
             <a:fld id="{D1352E03-2E80-4246-BE52-69E32A323EDD}" type="datetimeFigureOut">
               <a:rPr lang="en-US" smtClean="0"/>
-              <a:t>2020-09-08</a:t>
+              <a:t>2020-09-13</a:t>
             </a:fld>
             <a:endParaRPr lang="en-US"/>
           </a:p>
@@ -3775,7 +3902,7 @@
           <a:p>
             <a:fld id="{D1352E03-2E80-4246-BE52-69E32A323EDD}" type="datetimeFigureOut">
               <a:rPr lang="en-US" smtClean="0"/>
-              <a:t>2020-09-08</a:t>
+              <a:t>2020-09-13</a:t>
             </a:fld>
             <a:endParaRPr lang="en-US"/>
           </a:p>
@@ -3973,7 +4100,7 @@
           <a:p>
             <a:fld id="{D1352E03-2E80-4246-BE52-69E32A323EDD}" type="datetimeFigureOut">
               <a:rPr lang="en-US" smtClean="0"/>
-              <a:t>2020-09-08</a:t>
+              <a:t>2020-09-13</a:t>
             </a:fld>
             <a:endParaRPr lang="en-US"/>
           </a:p>
@@ -4248,7 +4375,7 @@
           <a:p>
             <a:fld id="{D1352E03-2E80-4246-BE52-69E32A323EDD}" type="datetimeFigureOut">
               <a:rPr lang="en-US" smtClean="0"/>
-              <a:t>2020-09-08</a:t>
+              <a:t>2020-09-13</a:t>
             </a:fld>
             <a:endParaRPr lang="en-US"/>
           </a:p>
@@ -4513,7 +4640,7 @@
           <a:p>
             <a:fld id="{D1352E03-2E80-4246-BE52-69E32A323EDD}" type="datetimeFigureOut">
               <a:rPr lang="en-US" smtClean="0"/>
-              <a:t>2020-09-08</a:t>
+              <a:t>2020-09-13</a:t>
             </a:fld>
             <a:endParaRPr lang="en-US"/>
           </a:p>
@@ -4925,7 +5052,7 @@
           <a:p>
             <a:fld id="{D1352E03-2E80-4246-BE52-69E32A323EDD}" type="datetimeFigureOut">
               <a:rPr lang="en-US" smtClean="0"/>
-              <a:t>2020-09-08</a:t>
+              <a:t>2020-09-13</a:t>
             </a:fld>
             <a:endParaRPr lang="en-US"/>
           </a:p>
@@ -5066,7 +5193,7 @@
           <a:p>
             <a:fld id="{D1352E03-2E80-4246-BE52-69E32A323EDD}" type="datetimeFigureOut">
               <a:rPr lang="en-US" smtClean="0"/>
-              <a:t>2020-09-08</a:t>
+              <a:t>2020-09-13</a:t>
             </a:fld>
             <a:endParaRPr lang="en-US"/>
           </a:p>
@@ -5179,7 +5306,7 @@
           <a:p>
             <a:fld id="{D1352E03-2E80-4246-BE52-69E32A323EDD}" type="datetimeFigureOut">
               <a:rPr lang="en-US" smtClean="0"/>
-              <a:t>2020-09-08</a:t>
+              <a:t>2020-09-13</a:t>
             </a:fld>
             <a:endParaRPr lang="en-US"/>
           </a:p>
@@ -5490,7 +5617,7 @@
           <a:p>
             <a:fld id="{D1352E03-2E80-4246-BE52-69E32A323EDD}" type="datetimeFigureOut">
               <a:rPr lang="en-US" smtClean="0"/>
-              <a:t>2020-09-08</a:t>
+              <a:t>2020-09-13</a:t>
             </a:fld>
             <a:endParaRPr lang="en-US"/>
           </a:p>
@@ -5778,7 +5905,7 @@
           <a:p>
             <a:fld id="{D1352E03-2E80-4246-BE52-69E32A323EDD}" type="datetimeFigureOut">
               <a:rPr lang="en-US" smtClean="0"/>
-              <a:t>2020-09-08</a:t>
+              <a:t>2020-09-13</a:t>
             </a:fld>
             <a:endParaRPr lang="en-US"/>
           </a:p>
@@ -6019,7 +6146,7 @@
           <a:p>
             <a:fld id="{D1352E03-2E80-4246-BE52-69E32A323EDD}" type="datetimeFigureOut">
               <a:rPr lang="en-US" smtClean="0"/>
-              <a:t>2020-09-08</a:t>
+              <a:t>2020-09-13</a:t>
             </a:fld>
             <a:endParaRPr lang="en-US"/>
           </a:p>
@@ -6438,10 +6565,10 @@
       </p:grpSpPr>
       <p:graphicFrame>
         <p:nvGraphicFramePr>
-          <p:cNvPr id="4" name="Diagram 3">
+          <p:cNvPr id="2" name="Diagram 1">
             <a:extLst>
               <a:ext uri="{FF2B5EF4-FFF2-40B4-BE49-F238E27FC236}">
-                <a16:creationId xmlns:a16="http://schemas.microsoft.com/office/drawing/2014/main" id="{4649D59A-E141-4D45-AF51-4EAF75B5D8A0}"/>
+                <a16:creationId xmlns:a16="http://schemas.microsoft.com/office/drawing/2014/main" id="{0DE8E158-17B3-4F5D-8712-0C94249C1AEF}"/>
               </a:ext>
             </a:extLst>
           </p:cNvPr>
@@ -6449,7 +6576,7 @@
           <p:nvPr>
             <p:extLst>
               <p:ext uri="{D42A27DB-BD31-4B8C-83A1-F6EECF244321}">
-                <p14:modId xmlns:p14="http://schemas.microsoft.com/office/powerpoint/2010/main" val="3581511108"/>
+                <p14:modId xmlns:p14="http://schemas.microsoft.com/office/powerpoint/2010/main" val="3372809770"/>
               </p:ext>
             </p:extLst>
           </p:nvPr>

</xml_diff>